<commit_message>
fix windows moved and resized
</commit_message>
<xml_diff>
--- a/Presentation.pptx
+++ b/Presentation.pptx
@@ -918,6 +918,753 @@
 </dgm:colorsDef>
 </file>
 
+<file path=ppt/diagrams/colors2.xml><?xml version="1.0" encoding="utf-8"?>
+<dgm:colorsDef xmlns:dgm="http://schemas.openxmlformats.org/drawingml/2006/diagram" xmlns:a="http://schemas.openxmlformats.org/drawingml/2006/main" uniqueId="urn:microsoft.com/office/officeart/2005/8/colors/accent1_2">
+  <dgm:title val=""/>
+  <dgm:desc val=""/>
+  <dgm:catLst>
+    <dgm:cat type="accent1" pri="11200"/>
+  </dgm:catLst>
+  <dgm:styleLbl name="node0">
+    <dgm:fillClrLst meth="repeat">
+      <a:schemeClr val="accent1"/>
+    </dgm:fillClrLst>
+    <dgm:linClrLst meth="repeat">
+      <a:schemeClr val="lt1"/>
+    </dgm:linClrLst>
+    <dgm:effectClrLst/>
+    <dgm:txLinClrLst/>
+    <dgm:txFillClrLst/>
+    <dgm:txEffectClrLst/>
+  </dgm:styleLbl>
+  <dgm:styleLbl name="alignNode1">
+    <dgm:fillClrLst meth="repeat">
+      <a:schemeClr val="accent1"/>
+    </dgm:fillClrLst>
+    <dgm:linClrLst meth="repeat">
+      <a:schemeClr val="accent1"/>
+    </dgm:linClrLst>
+    <dgm:effectClrLst/>
+    <dgm:txLinClrLst/>
+    <dgm:txFillClrLst/>
+    <dgm:txEffectClrLst/>
+  </dgm:styleLbl>
+  <dgm:styleLbl name="node1">
+    <dgm:fillClrLst meth="repeat">
+      <a:schemeClr val="accent1"/>
+    </dgm:fillClrLst>
+    <dgm:linClrLst meth="repeat">
+      <a:schemeClr val="lt1"/>
+    </dgm:linClrLst>
+    <dgm:effectClrLst/>
+    <dgm:txLinClrLst/>
+    <dgm:txFillClrLst/>
+    <dgm:txEffectClrLst/>
+  </dgm:styleLbl>
+  <dgm:styleLbl name="lnNode1">
+    <dgm:fillClrLst meth="repeat">
+      <a:schemeClr val="accent1"/>
+    </dgm:fillClrLst>
+    <dgm:linClrLst meth="repeat">
+      <a:schemeClr val="lt1"/>
+    </dgm:linClrLst>
+    <dgm:effectClrLst/>
+    <dgm:txLinClrLst/>
+    <dgm:txFillClrLst/>
+    <dgm:txEffectClrLst/>
+  </dgm:styleLbl>
+  <dgm:styleLbl name="vennNode1">
+    <dgm:fillClrLst meth="repeat">
+      <a:schemeClr val="accent1">
+        <a:alpha val="50000"/>
+      </a:schemeClr>
+    </dgm:fillClrLst>
+    <dgm:linClrLst meth="repeat">
+      <a:schemeClr val="lt1"/>
+    </dgm:linClrLst>
+    <dgm:effectClrLst/>
+    <dgm:txLinClrLst/>
+    <dgm:txFillClrLst/>
+    <dgm:txEffectClrLst/>
+  </dgm:styleLbl>
+  <dgm:styleLbl name="node2">
+    <dgm:fillClrLst meth="repeat">
+      <a:schemeClr val="accent1"/>
+    </dgm:fillClrLst>
+    <dgm:linClrLst meth="repeat">
+      <a:schemeClr val="lt1"/>
+    </dgm:linClrLst>
+    <dgm:effectClrLst/>
+    <dgm:txLinClrLst/>
+    <dgm:txFillClrLst/>
+    <dgm:txEffectClrLst/>
+  </dgm:styleLbl>
+  <dgm:styleLbl name="node3">
+    <dgm:fillClrLst meth="repeat">
+      <a:schemeClr val="accent1"/>
+    </dgm:fillClrLst>
+    <dgm:linClrLst meth="repeat">
+      <a:schemeClr val="lt1"/>
+    </dgm:linClrLst>
+    <dgm:effectClrLst/>
+    <dgm:txLinClrLst/>
+    <dgm:txFillClrLst/>
+    <dgm:txEffectClrLst/>
+  </dgm:styleLbl>
+  <dgm:styleLbl name="node4">
+    <dgm:fillClrLst meth="repeat">
+      <a:schemeClr val="accent1"/>
+    </dgm:fillClrLst>
+    <dgm:linClrLst meth="repeat">
+      <a:schemeClr val="lt1"/>
+    </dgm:linClrLst>
+    <dgm:effectClrLst/>
+    <dgm:txLinClrLst/>
+    <dgm:txFillClrLst/>
+    <dgm:txEffectClrLst/>
+  </dgm:styleLbl>
+  <dgm:styleLbl name="fgImgPlace1">
+    <dgm:fillClrLst meth="repeat">
+      <a:schemeClr val="accent1">
+        <a:tint val="50000"/>
+      </a:schemeClr>
+    </dgm:fillClrLst>
+    <dgm:linClrLst meth="repeat">
+      <a:schemeClr val="lt1"/>
+    </dgm:linClrLst>
+    <dgm:effectClrLst/>
+    <dgm:txLinClrLst/>
+    <dgm:txFillClrLst meth="repeat">
+      <a:schemeClr val="lt1"/>
+    </dgm:txFillClrLst>
+    <dgm:txEffectClrLst/>
+  </dgm:styleLbl>
+  <dgm:styleLbl name="alignImgPlace1">
+    <dgm:fillClrLst meth="repeat">
+      <a:schemeClr val="accent1">
+        <a:tint val="50000"/>
+      </a:schemeClr>
+    </dgm:fillClrLst>
+    <dgm:linClrLst meth="repeat">
+      <a:schemeClr val="lt1"/>
+    </dgm:linClrLst>
+    <dgm:effectClrLst/>
+    <dgm:txLinClrLst/>
+    <dgm:txFillClrLst meth="repeat">
+      <a:schemeClr val="lt1"/>
+    </dgm:txFillClrLst>
+    <dgm:txEffectClrLst/>
+  </dgm:styleLbl>
+  <dgm:styleLbl name="bgImgPlace1">
+    <dgm:fillClrLst meth="repeat">
+      <a:schemeClr val="accent1">
+        <a:tint val="50000"/>
+      </a:schemeClr>
+    </dgm:fillClrLst>
+    <dgm:linClrLst meth="repeat">
+      <a:schemeClr val="lt1"/>
+    </dgm:linClrLst>
+    <dgm:effectClrLst/>
+    <dgm:txLinClrLst/>
+    <dgm:txFillClrLst meth="repeat">
+      <a:schemeClr val="lt1"/>
+    </dgm:txFillClrLst>
+    <dgm:txEffectClrLst/>
+  </dgm:styleLbl>
+  <dgm:styleLbl name="sibTrans2D1">
+    <dgm:fillClrLst meth="repeat">
+      <a:schemeClr val="accent1">
+        <a:tint val="60000"/>
+      </a:schemeClr>
+    </dgm:fillClrLst>
+    <dgm:linClrLst meth="repeat">
+      <a:schemeClr val="accent1">
+        <a:tint val="60000"/>
+      </a:schemeClr>
+    </dgm:linClrLst>
+    <dgm:effectClrLst/>
+    <dgm:txLinClrLst/>
+    <dgm:txFillClrLst/>
+    <dgm:txEffectClrLst/>
+  </dgm:styleLbl>
+  <dgm:styleLbl name="fgSibTrans2D1">
+    <dgm:fillClrLst meth="repeat">
+      <a:schemeClr val="accent1">
+        <a:tint val="60000"/>
+      </a:schemeClr>
+    </dgm:fillClrLst>
+    <dgm:linClrLst meth="repeat">
+      <a:schemeClr val="accent1">
+        <a:tint val="60000"/>
+      </a:schemeClr>
+    </dgm:linClrLst>
+    <dgm:effectClrLst/>
+    <dgm:txLinClrLst/>
+    <dgm:txFillClrLst/>
+    <dgm:txEffectClrLst/>
+  </dgm:styleLbl>
+  <dgm:styleLbl name="bgSibTrans2D1">
+    <dgm:fillClrLst meth="repeat">
+      <a:schemeClr val="accent1">
+        <a:tint val="60000"/>
+      </a:schemeClr>
+    </dgm:fillClrLst>
+    <dgm:linClrLst meth="repeat">
+      <a:schemeClr val="accent1">
+        <a:tint val="60000"/>
+      </a:schemeClr>
+    </dgm:linClrLst>
+    <dgm:effectClrLst/>
+    <dgm:txLinClrLst/>
+    <dgm:txFillClrLst/>
+    <dgm:txEffectClrLst/>
+  </dgm:styleLbl>
+  <dgm:styleLbl name="sibTrans1D1">
+    <dgm:fillClrLst meth="repeat">
+      <a:schemeClr val="accent1"/>
+    </dgm:fillClrLst>
+    <dgm:linClrLst meth="repeat">
+      <a:schemeClr val="accent1"/>
+    </dgm:linClrLst>
+    <dgm:effectClrLst/>
+    <dgm:txLinClrLst/>
+    <dgm:txFillClrLst meth="repeat">
+      <a:schemeClr val="tx1"/>
+    </dgm:txFillClrLst>
+    <dgm:txEffectClrLst/>
+  </dgm:styleLbl>
+  <dgm:styleLbl name="callout">
+    <dgm:fillClrLst meth="repeat">
+      <a:schemeClr val="accent1"/>
+    </dgm:fillClrLst>
+    <dgm:linClrLst meth="repeat">
+      <a:schemeClr val="accent1">
+        <a:tint val="50000"/>
+      </a:schemeClr>
+    </dgm:linClrLst>
+    <dgm:effectClrLst/>
+    <dgm:txLinClrLst/>
+    <dgm:txFillClrLst meth="repeat">
+      <a:schemeClr val="tx1"/>
+    </dgm:txFillClrLst>
+    <dgm:txEffectClrLst/>
+  </dgm:styleLbl>
+  <dgm:styleLbl name="asst0">
+    <dgm:fillClrLst meth="repeat">
+      <a:schemeClr val="accent1"/>
+    </dgm:fillClrLst>
+    <dgm:linClrLst meth="repeat">
+      <a:schemeClr val="lt1"/>
+    </dgm:linClrLst>
+    <dgm:effectClrLst/>
+    <dgm:txLinClrLst/>
+    <dgm:txFillClrLst/>
+    <dgm:txEffectClrLst/>
+  </dgm:styleLbl>
+  <dgm:styleLbl name="asst1">
+    <dgm:fillClrLst meth="repeat">
+      <a:schemeClr val="accent1"/>
+    </dgm:fillClrLst>
+    <dgm:linClrLst meth="repeat">
+      <a:schemeClr val="lt1"/>
+    </dgm:linClrLst>
+    <dgm:effectClrLst/>
+    <dgm:txLinClrLst/>
+    <dgm:txFillClrLst/>
+    <dgm:txEffectClrLst/>
+  </dgm:styleLbl>
+  <dgm:styleLbl name="asst2">
+    <dgm:fillClrLst meth="repeat">
+      <a:schemeClr val="accent1"/>
+    </dgm:fillClrLst>
+    <dgm:linClrLst meth="repeat">
+      <a:schemeClr val="lt1"/>
+    </dgm:linClrLst>
+    <dgm:effectClrLst/>
+    <dgm:txLinClrLst/>
+    <dgm:txFillClrLst/>
+    <dgm:txEffectClrLst/>
+  </dgm:styleLbl>
+  <dgm:styleLbl name="asst3">
+    <dgm:fillClrLst meth="repeat">
+      <a:schemeClr val="accent1"/>
+    </dgm:fillClrLst>
+    <dgm:linClrLst meth="repeat">
+      <a:schemeClr val="lt1"/>
+    </dgm:linClrLst>
+    <dgm:effectClrLst/>
+    <dgm:txLinClrLst/>
+    <dgm:txFillClrLst/>
+    <dgm:txEffectClrLst/>
+  </dgm:styleLbl>
+  <dgm:styleLbl name="asst4">
+    <dgm:fillClrLst meth="repeat">
+      <a:schemeClr val="accent1"/>
+    </dgm:fillClrLst>
+    <dgm:linClrLst meth="repeat">
+      <a:schemeClr val="lt1"/>
+    </dgm:linClrLst>
+    <dgm:effectClrLst/>
+    <dgm:txLinClrLst/>
+    <dgm:txFillClrLst/>
+    <dgm:txEffectClrLst/>
+  </dgm:styleLbl>
+  <dgm:styleLbl name="parChTrans2D1">
+    <dgm:fillClrLst meth="repeat">
+      <a:schemeClr val="accent1">
+        <a:tint val="60000"/>
+      </a:schemeClr>
+    </dgm:fillClrLst>
+    <dgm:linClrLst meth="repeat">
+      <a:schemeClr val="accent1">
+        <a:tint val="60000"/>
+      </a:schemeClr>
+    </dgm:linClrLst>
+    <dgm:effectClrLst/>
+    <dgm:txLinClrLst/>
+    <dgm:txFillClrLst meth="repeat">
+      <a:schemeClr val="lt1"/>
+    </dgm:txFillClrLst>
+    <dgm:txEffectClrLst/>
+  </dgm:styleLbl>
+  <dgm:styleLbl name="parChTrans2D2">
+    <dgm:fillClrLst meth="repeat">
+      <a:schemeClr val="accent1"/>
+    </dgm:fillClrLst>
+    <dgm:linClrLst meth="repeat">
+      <a:schemeClr val="accent1"/>
+    </dgm:linClrLst>
+    <dgm:effectClrLst/>
+    <dgm:txLinClrLst/>
+    <dgm:txFillClrLst meth="repeat">
+      <a:schemeClr val="lt1"/>
+    </dgm:txFillClrLst>
+    <dgm:txEffectClrLst/>
+  </dgm:styleLbl>
+  <dgm:styleLbl name="parChTrans2D3">
+    <dgm:fillClrLst meth="repeat">
+      <a:schemeClr val="accent1"/>
+    </dgm:fillClrLst>
+    <dgm:linClrLst meth="repeat">
+      <a:schemeClr val="accent1"/>
+    </dgm:linClrLst>
+    <dgm:effectClrLst/>
+    <dgm:txLinClrLst/>
+    <dgm:txFillClrLst meth="repeat">
+      <a:schemeClr val="lt1"/>
+    </dgm:txFillClrLst>
+    <dgm:txEffectClrLst/>
+  </dgm:styleLbl>
+  <dgm:styleLbl name="parChTrans2D4">
+    <dgm:fillClrLst meth="repeat">
+      <a:schemeClr val="accent1"/>
+    </dgm:fillClrLst>
+    <dgm:linClrLst meth="repeat">
+      <a:schemeClr val="accent1"/>
+    </dgm:linClrLst>
+    <dgm:effectClrLst/>
+    <dgm:txLinClrLst/>
+    <dgm:txFillClrLst meth="repeat">
+      <a:schemeClr val="lt1"/>
+    </dgm:txFillClrLst>
+    <dgm:txEffectClrLst/>
+  </dgm:styleLbl>
+  <dgm:styleLbl name="parChTrans1D1">
+    <dgm:fillClrLst meth="repeat">
+      <a:schemeClr val="accent1"/>
+    </dgm:fillClrLst>
+    <dgm:linClrLst meth="repeat">
+      <a:schemeClr val="accent1">
+        <a:shade val="60000"/>
+      </a:schemeClr>
+    </dgm:linClrLst>
+    <dgm:effectClrLst/>
+    <dgm:txLinClrLst/>
+    <dgm:txFillClrLst meth="repeat">
+      <a:schemeClr val="tx1"/>
+    </dgm:txFillClrLst>
+    <dgm:txEffectClrLst/>
+  </dgm:styleLbl>
+  <dgm:styleLbl name="parChTrans1D2">
+    <dgm:fillClrLst meth="repeat">
+      <a:schemeClr val="accent1"/>
+    </dgm:fillClrLst>
+    <dgm:linClrLst meth="repeat">
+      <a:schemeClr val="accent1">
+        <a:shade val="60000"/>
+      </a:schemeClr>
+    </dgm:linClrLst>
+    <dgm:effectClrLst/>
+    <dgm:txLinClrLst/>
+    <dgm:txFillClrLst meth="repeat">
+      <a:schemeClr val="tx1"/>
+    </dgm:txFillClrLst>
+    <dgm:txEffectClrLst/>
+  </dgm:styleLbl>
+  <dgm:styleLbl name="parChTrans1D3">
+    <dgm:fillClrLst meth="repeat">
+      <a:schemeClr val="accent1"/>
+    </dgm:fillClrLst>
+    <dgm:linClrLst meth="repeat">
+      <a:schemeClr val="accent1">
+        <a:shade val="80000"/>
+      </a:schemeClr>
+    </dgm:linClrLst>
+    <dgm:effectClrLst/>
+    <dgm:txLinClrLst/>
+    <dgm:txFillClrLst meth="repeat">
+      <a:schemeClr val="tx1"/>
+    </dgm:txFillClrLst>
+    <dgm:txEffectClrLst/>
+  </dgm:styleLbl>
+  <dgm:styleLbl name="parChTrans1D4">
+    <dgm:fillClrLst meth="repeat">
+      <a:schemeClr val="accent1"/>
+    </dgm:fillClrLst>
+    <dgm:linClrLst meth="repeat">
+      <a:schemeClr val="accent1">
+        <a:shade val="80000"/>
+      </a:schemeClr>
+    </dgm:linClrLst>
+    <dgm:effectClrLst/>
+    <dgm:txLinClrLst/>
+    <dgm:txFillClrLst meth="repeat">
+      <a:schemeClr val="tx1"/>
+    </dgm:txFillClrLst>
+    <dgm:txEffectClrLst/>
+  </dgm:styleLbl>
+  <dgm:styleLbl name="fgAcc1">
+    <dgm:fillClrLst meth="repeat">
+      <a:schemeClr val="lt1">
+        <a:alpha val="90000"/>
+      </a:schemeClr>
+    </dgm:fillClrLst>
+    <dgm:linClrLst meth="repeat">
+      <a:schemeClr val="accent1"/>
+    </dgm:linClrLst>
+    <dgm:effectClrLst/>
+    <dgm:txLinClrLst/>
+    <dgm:txFillClrLst meth="repeat">
+      <a:schemeClr val="dk1"/>
+    </dgm:txFillClrLst>
+    <dgm:txEffectClrLst/>
+  </dgm:styleLbl>
+  <dgm:styleLbl name="conFgAcc1">
+    <dgm:fillClrLst meth="repeat">
+      <a:schemeClr val="lt1">
+        <a:alpha val="90000"/>
+      </a:schemeClr>
+    </dgm:fillClrLst>
+    <dgm:linClrLst meth="repeat">
+      <a:schemeClr val="accent1"/>
+    </dgm:linClrLst>
+    <dgm:effectClrLst/>
+    <dgm:txLinClrLst/>
+    <dgm:txFillClrLst meth="repeat">
+      <a:schemeClr val="dk1"/>
+    </dgm:txFillClrLst>
+    <dgm:txEffectClrLst/>
+  </dgm:styleLbl>
+  <dgm:styleLbl name="alignAcc1">
+    <dgm:fillClrLst meth="repeat">
+      <a:schemeClr val="lt1">
+        <a:alpha val="90000"/>
+      </a:schemeClr>
+    </dgm:fillClrLst>
+    <dgm:linClrLst meth="repeat">
+      <a:schemeClr val="accent1"/>
+    </dgm:linClrLst>
+    <dgm:effectClrLst/>
+    <dgm:txLinClrLst/>
+    <dgm:txFillClrLst meth="repeat">
+      <a:schemeClr val="dk1"/>
+    </dgm:txFillClrLst>
+    <dgm:txEffectClrLst/>
+  </dgm:styleLbl>
+  <dgm:styleLbl name="trAlignAcc1">
+    <dgm:fillClrLst meth="repeat">
+      <a:schemeClr val="lt1">
+        <a:alpha val="40000"/>
+      </a:schemeClr>
+    </dgm:fillClrLst>
+    <dgm:linClrLst meth="repeat">
+      <a:schemeClr val="accent1"/>
+    </dgm:linClrLst>
+    <dgm:effectClrLst/>
+    <dgm:txLinClrLst/>
+    <dgm:txFillClrLst meth="repeat">
+      <a:schemeClr val="dk1"/>
+    </dgm:txFillClrLst>
+    <dgm:txEffectClrLst/>
+  </dgm:styleLbl>
+  <dgm:styleLbl name="bgAcc1">
+    <dgm:fillClrLst meth="repeat">
+      <a:schemeClr val="lt1">
+        <a:alpha val="90000"/>
+      </a:schemeClr>
+    </dgm:fillClrLst>
+    <dgm:linClrLst meth="repeat">
+      <a:schemeClr val="accent1"/>
+    </dgm:linClrLst>
+    <dgm:effectClrLst/>
+    <dgm:txLinClrLst/>
+    <dgm:txFillClrLst meth="repeat">
+      <a:schemeClr val="dk1"/>
+    </dgm:txFillClrLst>
+    <dgm:txEffectClrLst/>
+  </dgm:styleLbl>
+  <dgm:styleLbl name="solidFgAcc1">
+    <dgm:fillClrLst meth="repeat">
+      <a:schemeClr val="lt1"/>
+    </dgm:fillClrLst>
+    <dgm:linClrLst meth="repeat">
+      <a:schemeClr val="accent1"/>
+    </dgm:linClrLst>
+    <dgm:effectClrLst/>
+    <dgm:txLinClrLst/>
+    <dgm:txFillClrLst meth="repeat">
+      <a:schemeClr val="dk1"/>
+    </dgm:txFillClrLst>
+    <dgm:txEffectClrLst/>
+  </dgm:styleLbl>
+  <dgm:styleLbl name="solidAlignAcc1">
+    <dgm:fillClrLst meth="repeat">
+      <a:schemeClr val="lt1"/>
+    </dgm:fillClrLst>
+    <dgm:linClrLst meth="repeat">
+      <a:schemeClr val="accent1"/>
+    </dgm:linClrLst>
+    <dgm:effectClrLst/>
+    <dgm:txLinClrLst/>
+    <dgm:txFillClrLst meth="repeat">
+      <a:schemeClr val="dk1"/>
+    </dgm:txFillClrLst>
+    <dgm:txEffectClrLst/>
+  </dgm:styleLbl>
+  <dgm:styleLbl name="solidBgAcc1">
+    <dgm:fillClrLst meth="repeat">
+      <a:schemeClr val="lt1"/>
+    </dgm:fillClrLst>
+    <dgm:linClrLst meth="repeat">
+      <a:schemeClr val="accent1"/>
+    </dgm:linClrLst>
+    <dgm:effectClrLst/>
+    <dgm:txLinClrLst/>
+    <dgm:txFillClrLst meth="repeat">
+      <a:schemeClr val="dk1"/>
+    </dgm:txFillClrLst>
+    <dgm:txEffectClrLst/>
+  </dgm:styleLbl>
+  <dgm:styleLbl name="fgAccFollowNode1">
+    <dgm:fillClrLst meth="repeat">
+      <a:schemeClr val="accent1">
+        <a:alpha val="90000"/>
+        <a:tint val="40000"/>
+      </a:schemeClr>
+    </dgm:fillClrLst>
+    <dgm:linClrLst meth="repeat">
+      <a:schemeClr val="accent1">
+        <a:alpha val="90000"/>
+        <a:tint val="40000"/>
+      </a:schemeClr>
+    </dgm:linClrLst>
+    <dgm:effectClrLst/>
+    <dgm:txLinClrLst/>
+    <dgm:txFillClrLst meth="repeat">
+      <a:schemeClr val="dk1"/>
+    </dgm:txFillClrLst>
+    <dgm:txEffectClrLst/>
+  </dgm:styleLbl>
+  <dgm:styleLbl name="alignAccFollowNode1">
+    <dgm:fillClrLst meth="repeat">
+      <a:schemeClr val="accent1">
+        <a:alpha val="90000"/>
+        <a:tint val="40000"/>
+      </a:schemeClr>
+    </dgm:fillClrLst>
+    <dgm:linClrLst meth="repeat">
+      <a:schemeClr val="accent1">
+        <a:alpha val="90000"/>
+        <a:tint val="40000"/>
+      </a:schemeClr>
+    </dgm:linClrLst>
+    <dgm:effectClrLst/>
+    <dgm:txLinClrLst/>
+    <dgm:txFillClrLst meth="repeat">
+      <a:schemeClr val="dk1"/>
+    </dgm:txFillClrLst>
+    <dgm:txEffectClrLst/>
+  </dgm:styleLbl>
+  <dgm:styleLbl name="bgAccFollowNode1">
+    <dgm:fillClrLst meth="repeat">
+      <a:schemeClr val="accent1">
+        <a:alpha val="90000"/>
+        <a:tint val="40000"/>
+      </a:schemeClr>
+    </dgm:fillClrLst>
+    <dgm:linClrLst meth="repeat">
+      <a:schemeClr val="accent1">
+        <a:alpha val="90000"/>
+        <a:tint val="40000"/>
+      </a:schemeClr>
+    </dgm:linClrLst>
+    <dgm:effectClrLst/>
+    <dgm:txLinClrLst/>
+    <dgm:txFillClrLst meth="repeat">
+      <a:schemeClr val="dk1"/>
+    </dgm:txFillClrLst>
+    <dgm:txEffectClrLst/>
+  </dgm:styleLbl>
+  <dgm:styleLbl name="fgAcc0">
+    <dgm:fillClrLst meth="repeat">
+      <a:schemeClr val="lt1">
+        <a:alpha val="90000"/>
+      </a:schemeClr>
+    </dgm:fillClrLst>
+    <dgm:linClrLst meth="repeat">
+      <a:schemeClr val="accent1"/>
+    </dgm:linClrLst>
+    <dgm:effectClrLst/>
+    <dgm:txLinClrLst/>
+    <dgm:txFillClrLst meth="repeat">
+      <a:schemeClr val="dk1"/>
+    </dgm:txFillClrLst>
+    <dgm:txEffectClrLst/>
+  </dgm:styleLbl>
+  <dgm:styleLbl name="fgAcc2">
+    <dgm:fillClrLst meth="repeat">
+      <a:schemeClr val="lt1">
+        <a:alpha val="90000"/>
+      </a:schemeClr>
+    </dgm:fillClrLst>
+    <dgm:linClrLst meth="repeat">
+      <a:schemeClr val="accent1"/>
+    </dgm:linClrLst>
+    <dgm:effectClrLst/>
+    <dgm:txLinClrLst/>
+    <dgm:txFillClrLst meth="repeat">
+      <a:schemeClr val="dk1"/>
+    </dgm:txFillClrLst>
+    <dgm:txEffectClrLst/>
+  </dgm:styleLbl>
+  <dgm:styleLbl name="fgAcc3">
+    <dgm:fillClrLst meth="repeat">
+      <a:schemeClr val="lt1">
+        <a:alpha val="90000"/>
+      </a:schemeClr>
+    </dgm:fillClrLst>
+    <dgm:linClrLst meth="repeat">
+      <a:schemeClr val="accent1"/>
+    </dgm:linClrLst>
+    <dgm:effectClrLst/>
+    <dgm:txLinClrLst/>
+    <dgm:txFillClrLst meth="repeat">
+      <a:schemeClr val="dk1"/>
+    </dgm:txFillClrLst>
+    <dgm:txEffectClrLst/>
+  </dgm:styleLbl>
+  <dgm:styleLbl name="fgAcc4">
+    <dgm:fillClrLst meth="repeat">
+      <a:schemeClr val="lt1">
+        <a:alpha val="90000"/>
+      </a:schemeClr>
+    </dgm:fillClrLst>
+    <dgm:linClrLst meth="repeat">
+      <a:schemeClr val="accent1"/>
+    </dgm:linClrLst>
+    <dgm:effectClrLst/>
+    <dgm:txLinClrLst/>
+    <dgm:txFillClrLst meth="repeat">
+      <a:schemeClr val="dk1"/>
+    </dgm:txFillClrLst>
+    <dgm:txEffectClrLst/>
+  </dgm:styleLbl>
+  <dgm:styleLbl name="bgShp">
+    <dgm:fillClrLst meth="repeat">
+      <a:schemeClr val="accent1">
+        <a:tint val="40000"/>
+      </a:schemeClr>
+    </dgm:fillClrLst>
+    <dgm:linClrLst meth="repeat">
+      <a:schemeClr val="accent1"/>
+    </dgm:linClrLst>
+    <dgm:effectClrLst/>
+    <dgm:txLinClrLst/>
+    <dgm:txFillClrLst meth="repeat">
+      <a:schemeClr val="dk1"/>
+    </dgm:txFillClrLst>
+    <dgm:txEffectClrLst/>
+  </dgm:styleLbl>
+  <dgm:styleLbl name="dkBgShp">
+    <dgm:fillClrLst meth="repeat">
+      <a:schemeClr val="accent1">
+        <a:shade val="80000"/>
+      </a:schemeClr>
+    </dgm:fillClrLst>
+    <dgm:linClrLst meth="repeat">
+      <a:schemeClr val="accent1"/>
+    </dgm:linClrLst>
+    <dgm:effectClrLst/>
+    <dgm:txLinClrLst/>
+    <dgm:txFillClrLst meth="repeat">
+      <a:schemeClr val="lt1"/>
+    </dgm:txFillClrLst>
+    <dgm:txEffectClrLst/>
+  </dgm:styleLbl>
+  <dgm:styleLbl name="trBgShp">
+    <dgm:fillClrLst meth="repeat">
+      <a:schemeClr val="accent1">
+        <a:tint val="50000"/>
+        <a:alpha val="40000"/>
+      </a:schemeClr>
+    </dgm:fillClrLst>
+    <dgm:linClrLst meth="repeat">
+      <a:schemeClr val="accent1"/>
+    </dgm:linClrLst>
+    <dgm:effectClrLst/>
+    <dgm:txLinClrLst/>
+    <dgm:txFillClrLst meth="repeat">
+      <a:schemeClr val="lt1"/>
+    </dgm:txFillClrLst>
+    <dgm:txEffectClrLst/>
+  </dgm:styleLbl>
+  <dgm:styleLbl name="fgShp">
+    <dgm:fillClrLst meth="repeat">
+      <a:schemeClr val="accent1">
+        <a:tint val="60000"/>
+      </a:schemeClr>
+    </dgm:fillClrLst>
+    <dgm:linClrLst meth="repeat">
+      <a:schemeClr val="lt1"/>
+    </dgm:linClrLst>
+    <dgm:effectClrLst/>
+    <dgm:txLinClrLst/>
+    <dgm:txFillClrLst meth="repeat">
+      <a:schemeClr val="dk1"/>
+    </dgm:txFillClrLst>
+    <dgm:txEffectClrLst/>
+  </dgm:styleLbl>
+  <dgm:styleLbl name="revTx">
+    <dgm:fillClrLst meth="repeat">
+      <a:schemeClr val="lt1">
+        <a:alpha val="0"/>
+      </a:schemeClr>
+    </dgm:fillClrLst>
+    <dgm:linClrLst meth="repeat">
+      <a:schemeClr val="dk1">
+        <a:alpha val="0"/>
+      </a:schemeClr>
+    </dgm:linClrLst>
+    <dgm:effectClrLst/>
+    <dgm:txLinClrLst/>
+    <dgm:txFillClrLst meth="repeat">
+      <a:schemeClr val="tx1"/>
+    </dgm:txFillClrLst>
+    <dgm:txEffectClrLst/>
+  </dgm:styleLbl>
+</dgm:colorsDef>
+</file>
+
 <file path=ppt/diagrams/data1.xml><?xml version="1.0" encoding="utf-8"?>
 <dgm:dataModel xmlns:dgm="http://schemas.openxmlformats.org/drawingml/2006/diagram" xmlns:a="http://schemas.openxmlformats.org/drawingml/2006/main">
   <dgm:ptLst>
@@ -1213,6 +1960,533 @@
     <dgm:cxn modelId="{2DCC0C79-D17C-4625-A51E-8C6146272B0A}" type="presParOf" srcId="{D5C9CF54-A3DB-4262-A188-C006BBF08A29}" destId="{7C23080D-6185-431F-BAF8-5277AA3C0E29}" srcOrd="4" destOrd="0" presId="urn:microsoft.com/office/officeart/2019/1/layout/PeoplePortraitsList"/>
     <dgm:cxn modelId="{A2D210FF-C687-4AED-82B0-395AAD28B698}" type="presParOf" srcId="{D5C9CF54-A3DB-4262-A188-C006BBF08A29}" destId="{EE420F84-477D-4635-BEF8-66426E9A259D}" srcOrd="5" destOrd="0" presId="urn:microsoft.com/office/officeart/2019/1/layout/PeoplePortraitsList"/>
     <dgm:cxn modelId="{948ADD0E-8022-4129-AB57-AF1F16DEEC20}" type="presParOf" srcId="{D5C9CF54-A3DB-4262-A188-C006BBF08A29}" destId="{DB61A93F-5AE0-4A97-AFE4-E1EA7F61D044}" srcOrd="6" destOrd="0" presId="urn:microsoft.com/office/officeart/2019/1/layout/PeoplePortraitsList"/>
+  </dgm:cxnLst>
+  <dgm:bg/>
+  <dgm:whole/>
+  <dgm:extLst>
+    <a:ext uri="http://schemas.microsoft.com/office/drawing/2008/diagram">
+      <dsp:dataModelExt xmlns:dsp="http://schemas.microsoft.com/office/drawing/2008/diagram" relId="rId6" minVer="http://schemas.openxmlformats.org/drawingml/2006/diagram"/>
+    </a:ext>
+  </dgm:extLst>
+</dgm:dataModel>
+</file>
+
+<file path=ppt/diagrams/data2.xml><?xml version="1.0" encoding="utf-8"?>
+<dgm:dataModel xmlns:dgm="http://schemas.openxmlformats.org/drawingml/2006/diagram" xmlns:a="http://schemas.openxmlformats.org/drawingml/2006/main">
+  <dgm:ptLst>
+    <dgm:pt modelId="{D950E120-AE11-4988-A9BA-1E90C3A9CEE5}" type="doc">
+      <dgm:prSet loTypeId="urn:microsoft.com/office/officeart/2018/2/layout/IconVerticalSolidList" loCatId="icon" qsTypeId="urn:microsoft.com/office/officeart/2005/8/quickstyle/simple1" qsCatId="simple" csTypeId="urn:microsoft.com/office/officeart/2005/8/colors/accent1_2" csCatId="accent1" phldr="1"/>
+      <dgm:spPr/>
+      <dgm:t>
+        <a:bodyPr/>
+        <a:lstStyle/>
+        <a:p>
+          <a:endParaRPr lang="en-US"/>
+        </a:p>
+      </dgm:t>
+    </dgm:pt>
+    <dgm:pt modelId="{F1B1B249-0782-45B9-A335-69FA2DFFE380}">
+      <dgm:prSet/>
+      <dgm:spPr/>
+      <dgm:t>
+        <a:bodyPr/>
+        <a:lstStyle/>
+        <a:p>
+          <a:pPr>
+            <a:lnSpc>
+              <a:spcPct val="100000"/>
+            </a:lnSpc>
+          </a:pPr>
+          <a:r>
+            <a:rPr lang="en-US"/>
+            <a:t>Lấy tâm (Centroid)</a:t>
+          </a:r>
+        </a:p>
+      </dgm:t>
+    </dgm:pt>
+    <dgm:pt modelId="{32EE7E13-D882-4B19-A3A4-32DDBD750DE1}" type="parTrans" cxnId="{E1DA67B4-4B64-4C77-810D-2A0A1000FD2A}">
+      <dgm:prSet/>
+      <dgm:spPr/>
+      <dgm:t>
+        <a:bodyPr/>
+        <a:lstStyle/>
+        <a:p>
+          <a:endParaRPr lang="en-US"/>
+        </a:p>
+      </dgm:t>
+    </dgm:pt>
+    <dgm:pt modelId="{60EBFB5C-7A7B-493B-A270-011E3D4EF148}" type="sibTrans" cxnId="{E1DA67B4-4B64-4C77-810D-2A0A1000FD2A}">
+      <dgm:prSet/>
+      <dgm:spPr/>
+      <dgm:t>
+        <a:bodyPr/>
+        <a:lstStyle/>
+        <a:p>
+          <a:endParaRPr lang="en-US"/>
+        </a:p>
+      </dgm:t>
+    </dgm:pt>
+    <dgm:pt modelId="{82C776C0-D9CF-4DAA-8767-C4C9E5DD5F0B}">
+      <dgm:prSet/>
+      <dgm:spPr/>
+      <dgm:t>
+        <a:bodyPr/>
+        <a:lstStyle/>
+        <a:p>
+          <a:pPr>
+            <a:lnSpc>
+              <a:spcPct val="100000"/>
+            </a:lnSpc>
+          </a:pPr>
+          <a:r>
+            <a:rPr lang="en-US"/>
+            <a:t>Lấy diện tích (Area)</a:t>
+          </a:r>
+        </a:p>
+      </dgm:t>
+    </dgm:pt>
+    <dgm:pt modelId="{5852CEF9-F6A4-4AB2-B029-468FC4229C27}" type="parTrans" cxnId="{63CA673F-FA2F-4914-8475-78C20F55CE8B}">
+      <dgm:prSet/>
+      <dgm:spPr/>
+      <dgm:t>
+        <a:bodyPr/>
+        <a:lstStyle/>
+        <a:p>
+          <a:endParaRPr lang="en-US"/>
+        </a:p>
+      </dgm:t>
+    </dgm:pt>
+    <dgm:pt modelId="{F8C370E7-1A01-4F64-BABD-5AEC760029AA}" type="sibTrans" cxnId="{63CA673F-FA2F-4914-8475-78C20F55CE8B}">
+      <dgm:prSet/>
+      <dgm:spPr/>
+      <dgm:t>
+        <a:bodyPr/>
+        <a:lstStyle/>
+        <a:p>
+          <a:endParaRPr lang="en-US"/>
+        </a:p>
+      </dgm:t>
+    </dgm:pt>
+    <dgm:pt modelId="{7788AC43-B382-454F-B705-8679FA415611}">
+      <dgm:prSet/>
+      <dgm:spPr/>
+      <dgm:t>
+        <a:bodyPr/>
+        <a:lstStyle/>
+        <a:p>
+          <a:pPr>
+            <a:lnSpc>
+              <a:spcPct val="100000"/>
+            </a:lnSpc>
+          </a:pPr>
+          <a:r>
+            <a:rPr lang="en-US"/>
+            <a:t>Kiểm tra điểm chứa trong (IsInside)</a:t>
+          </a:r>
+        </a:p>
+      </dgm:t>
+    </dgm:pt>
+    <dgm:pt modelId="{FD7284DF-F946-4489-B162-6C61619438B1}" type="parTrans" cxnId="{42E2BD70-DCD9-4FC9-881E-4D1CBCE6C5A3}">
+      <dgm:prSet/>
+      <dgm:spPr/>
+      <dgm:t>
+        <a:bodyPr/>
+        <a:lstStyle/>
+        <a:p>
+          <a:endParaRPr lang="en-US"/>
+        </a:p>
+      </dgm:t>
+    </dgm:pt>
+    <dgm:pt modelId="{FBB0EA72-FB63-4972-8DBD-8039CF56C96E}" type="sibTrans" cxnId="{42E2BD70-DCD9-4FC9-881E-4D1CBCE6C5A3}">
+      <dgm:prSet/>
+      <dgm:spPr/>
+      <dgm:t>
+        <a:bodyPr/>
+        <a:lstStyle/>
+        <a:p>
+          <a:endParaRPr lang="en-US"/>
+        </a:p>
+      </dgm:t>
+    </dgm:pt>
+    <dgm:pt modelId="{4363840F-9B5E-493E-B623-C1CBF64551E9}">
+      <dgm:prSet/>
+      <dgm:spPr/>
+      <dgm:t>
+        <a:bodyPr/>
+        <a:lstStyle/>
+        <a:p>
+          <a:pPr>
+            <a:lnSpc>
+              <a:spcPct val="100000"/>
+            </a:lnSpc>
+          </a:pPr>
+          <a:r>
+            <a:rPr lang="en-US"/>
+            <a:t>Vẽ Viền (draw)</a:t>
+          </a:r>
+        </a:p>
+      </dgm:t>
+    </dgm:pt>
+    <dgm:pt modelId="{2BE6C7BD-AC5F-4661-84BE-1E4CD75F91B7}" type="parTrans" cxnId="{4F90F03F-9E82-4F6E-8C72-70D25FB4281B}">
+      <dgm:prSet/>
+      <dgm:spPr/>
+      <dgm:t>
+        <a:bodyPr/>
+        <a:lstStyle/>
+        <a:p>
+          <a:endParaRPr lang="en-US"/>
+        </a:p>
+      </dgm:t>
+    </dgm:pt>
+    <dgm:pt modelId="{235AE275-15FC-47B0-85AC-F53847550EED}" type="sibTrans" cxnId="{4F90F03F-9E82-4F6E-8C72-70D25FB4281B}">
+      <dgm:prSet/>
+      <dgm:spPr/>
+      <dgm:t>
+        <a:bodyPr/>
+        <a:lstStyle/>
+        <a:p>
+          <a:endParaRPr lang="en-US"/>
+        </a:p>
+      </dgm:t>
+    </dgm:pt>
+    <dgm:pt modelId="{C1C81BA1-DF92-481B-9A6B-37E4A3E5D126}">
+      <dgm:prSet/>
+      <dgm:spPr/>
+      <dgm:t>
+        <a:bodyPr/>
+        <a:lstStyle/>
+        <a:p>
+          <a:pPr>
+            <a:lnSpc>
+              <a:spcPct val="100000"/>
+            </a:lnSpc>
+          </a:pPr>
+          <a:r>
+            <a:rPr lang="en-US"/>
+            <a:t>Tô nền (fill)</a:t>
+          </a:r>
+        </a:p>
+      </dgm:t>
+    </dgm:pt>
+    <dgm:pt modelId="{54BDE39A-D4E6-4577-9665-3021D229A758}" type="parTrans" cxnId="{CAEA6DCA-D81B-4E21-8B1A-A3AE2C6EBF87}">
+      <dgm:prSet/>
+      <dgm:spPr/>
+      <dgm:t>
+        <a:bodyPr/>
+        <a:lstStyle/>
+        <a:p>
+          <a:endParaRPr lang="en-US"/>
+        </a:p>
+      </dgm:t>
+    </dgm:pt>
+    <dgm:pt modelId="{B8756E9C-878E-46C8-9560-45AC9672162E}" type="sibTrans" cxnId="{CAEA6DCA-D81B-4E21-8B1A-A3AE2C6EBF87}">
+      <dgm:prSet/>
+      <dgm:spPr/>
+      <dgm:t>
+        <a:bodyPr/>
+        <a:lstStyle/>
+        <a:p>
+          <a:endParaRPr lang="en-US"/>
+        </a:p>
+      </dgm:t>
+    </dgm:pt>
+    <dgm:pt modelId="{6F84AEFE-F266-41B4-9994-4FC97D39A133}" type="pres">
+      <dgm:prSet presAssocID="{D950E120-AE11-4988-A9BA-1E90C3A9CEE5}" presName="root" presStyleCnt="0">
+        <dgm:presLayoutVars>
+          <dgm:dir/>
+          <dgm:resizeHandles val="exact"/>
+        </dgm:presLayoutVars>
+      </dgm:prSet>
+      <dgm:spPr/>
+    </dgm:pt>
+    <dgm:pt modelId="{A2C19D44-A573-4847-B52D-3917AC163C18}" type="pres">
+      <dgm:prSet presAssocID="{F1B1B249-0782-45B9-A335-69FA2DFFE380}" presName="compNode" presStyleCnt="0"/>
+      <dgm:spPr/>
+    </dgm:pt>
+    <dgm:pt modelId="{020FA305-92B4-4AE6-9129-A0981EE9A063}" type="pres">
+      <dgm:prSet presAssocID="{F1B1B249-0782-45B9-A335-69FA2DFFE380}" presName="bgRect" presStyleLbl="bgShp" presStyleIdx="0" presStyleCnt="5"/>
+      <dgm:spPr/>
+    </dgm:pt>
+    <dgm:pt modelId="{0C0CE71B-8826-4C57-BC8A-C4B1C2AE2812}" type="pres">
+      <dgm:prSet presAssocID="{F1B1B249-0782-45B9-A335-69FA2DFFE380}" presName="iconRect" presStyleLbl="node1" presStyleIdx="0" presStyleCnt="5"/>
+      <dgm:spPr>
+        <a:blipFill>
+          <a:blip xmlns:r="http://schemas.openxmlformats.org/officeDocument/2006/relationships" r:embed="rId1">
+            <a:extLst>
+              <a:ext uri="{28A0092B-C50C-407E-A947-70E740481C1C}">
+                <a14:useLocalDpi xmlns:a14="http://schemas.microsoft.com/office/drawing/2010/main" val="0"/>
+              </a:ext>
+              <a:ext uri="{96DAC541-7B7A-43D3-8B79-37D633B846F1}">
+                <asvg:svgBlip xmlns:asvg="http://schemas.microsoft.com/office/drawing/2016/SVG/main" r:embed="rId2"/>
+              </a:ext>
+            </a:extLst>
+          </a:blip>
+          <a:stretch>
+            <a:fillRect/>
+          </a:stretch>
+        </a:blipFill>
+      </dgm:spPr>
+      <dgm:extLst>
+        <a:ext uri="{E40237B7-FDA0-4F09-8148-C483321AD2D9}">
+          <dgm14:cNvPr xmlns:dgm14="http://schemas.microsoft.com/office/drawing/2010/diagram" id="0" name="" descr="Whole Pizza"/>
+        </a:ext>
+      </dgm:extLst>
+    </dgm:pt>
+    <dgm:pt modelId="{15438C02-3C04-4262-92F0-1FE3C52BDCB4}" type="pres">
+      <dgm:prSet presAssocID="{F1B1B249-0782-45B9-A335-69FA2DFFE380}" presName="spaceRect" presStyleCnt="0"/>
+      <dgm:spPr/>
+    </dgm:pt>
+    <dgm:pt modelId="{80321459-9FB9-4652-AE82-23C50B7AC704}" type="pres">
+      <dgm:prSet presAssocID="{F1B1B249-0782-45B9-A335-69FA2DFFE380}" presName="parTx" presStyleLbl="revTx" presStyleIdx="0" presStyleCnt="5">
+        <dgm:presLayoutVars>
+          <dgm:chMax val="0"/>
+          <dgm:chPref val="0"/>
+        </dgm:presLayoutVars>
+      </dgm:prSet>
+      <dgm:spPr/>
+    </dgm:pt>
+    <dgm:pt modelId="{B8FA7C1E-DFA7-4B38-B705-97C7BB107F02}" type="pres">
+      <dgm:prSet presAssocID="{60EBFB5C-7A7B-493B-A270-011E3D4EF148}" presName="sibTrans" presStyleCnt="0"/>
+      <dgm:spPr/>
+    </dgm:pt>
+    <dgm:pt modelId="{6BA84590-4268-4F07-BF1C-BAF1621E9DB6}" type="pres">
+      <dgm:prSet presAssocID="{82C776C0-D9CF-4DAA-8767-C4C9E5DD5F0B}" presName="compNode" presStyleCnt="0"/>
+      <dgm:spPr/>
+    </dgm:pt>
+    <dgm:pt modelId="{FD089904-BDC7-4360-9591-693A63A617DC}" type="pres">
+      <dgm:prSet presAssocID="{82C776C0-D9CF-4DAA-8767-C4C9E5DD5F0B}" presName="bgRect" presStyleLbl="bgShp" presStyleIdx="1" presStyleCnt="5"/>
+      <dgm:spPr/>
+    </dgm:pt>
+    <dgm:pt modelId="{5710E18B-2407-4DE9-B516-C3F9742A5C1B}" type="pres">
+      <dgm:prSet presAssocID="{82C776C0-D9CF-4DAA-8767-C4C9E5DD5F0B}" presName="iconRect" presStyleLbl="node1" presStyleIdx="1" presStyleCnt="5"/>
+      <dgm:spPr>
+        <a:blipFill>
+          <a:blip xmlns:r="http://schemas.openxmlformats.org/officeDocument/2006/relationships" r:embed="rId3">
+            <a:extLst>
+              <a:ext uri="{28A0092B-C50C-407E-A947-70E740481C1C}">
+                <a14:useLocalDpi xmlns:a14="http://schemas.microsoft.com/office/drawing/2010/main" val="0"/>
+              </a:ext>
+              <a:ext uri="{96DAC541-7B7A-43D3-8B79-37D633B846F1}">
+                <asvg:svgBlip xmlns:asvg="http://schemas.microsoft.com/office/drawing/2016/SVG/main" r:embed="rId4"/>
+              </a:ext>
+            </a:extLst>
+          </a:blip>
+          <a:stretch>
+            <a:fillRect/>
+          </a:stretch>
+        </a:blipFill>
+      </dgm:spPr>
+      <dgm:extLst>
+        <a:ext uri="{E40237B7-FDA0-4F09-8148-C483321AD2D9}">
+          <dgm14:cNvPr xmlns:dgm14="http://schemas.microsoft.com/office/drawing/2010/diagram" id="0" name="" descr="DJ"/>
+        </a:ext>
+      </dgm:extLst>
+    </dgm:pt>
+    <dgm:pt modelId="{1F1CBC80-24DA-4AD1-AB5B-9C8B92AAE403}" type="pres">
+      <dgm:prSet presAssocID="{82C776C0-D9CF-4DAA-8767-C4C9E5DD5F0B}" presName="spaceRect" presStyleCnt="0"/>
+      <dgm:spPr/>
+    </dgm:pt>
+    <dgm:pt modelId="{C393B845-CB0E-4182-AF6F-D1BE134FF13C}" type="pres">
+      <dgm:prSet presAssocID="{82C776C0-D9CF-4DAA-8767-C4C9E5DD5F0B}" presName="parTx" presStyleLbl="revTx" presStyleIdx="1" presStyleCnt="5">
+        <dgm:presLayoutVars>
+          <dgm:chMax val="0"/>
+          <dgm:chPref val="0"/>
+        </dgm:presLayoutVars>
+      </dgm:prSet>
+      <dgm:spPr/>
+    </dgm:pt>
+    <dgm:pt modelId="{B497C2EF-56D2-4FEC-B1C3-D556663E740B}" type="pres">
+      <dgm:prSet presAssocID="{F8C370E7-1A01-4F64-BABD-5AEC760029AA}" presName="sibTrans" presStyleCnt="0"/>
+      <dgm:spPr/>
+    </dgm:pt>
+    <dgm:pt modelId="{4F999BF7-2B4C-4B31-887F-200B85033C17}" type="pres">
+      <dgm:prSet presAssocID="{7788AC43-B382-454F-B705-8679FA415611}" presName="compNode" presStyleCnt="0"/>
+      <dgm:spPr/>
+    </dgm:pt>
+    <dgm:pt modelId="{2E206216-BDD5-4C78-89CD-F6269DD4DE2F}" type="pres">
+      <dgm:prSet presAssocID="{7788AC43-B382-454F-B705-8679FA415611}" presName="bgRect" presStyleLbl="bgShp" presStyleIdx="2" presStyleCnt="5"/>
+      <dgm:spPr/>
+    </dgm:pt>
+    <dgm:pt modelId="{B0A85CD9-D0EF-4D4F-976C-506B695CABA9}" type="pres">
+      <dgm:prSet presAssocID="{7788AC43-B382-454F-B705-8679FA415611}" presName="iconRect" presStyleLbl="node1" presStyleIdx="2" presStyleCnt="5"/>
+      <dgm:spPr>
+        <a:blipFill>
+          <a:blip xmlns:r="http://schemas.openxmlformats.org/officeDocument/2006/relationships" r:embed="rId5">
+            <a:extLst>
+              <a:ext uri="{28A0092B-C50C-407E-A947-70E740481C1C}">
+                <a14:useLocalDpi xmlns:a14="http://schemas.microsoft.com/office/drawing/2010/main" val="0"/>
+              </a:ext>
+              <a:ext uri="{96DAC541-7B7A-43D3-8B79-37D633B846F1}">
+                <asvg:svgBlip xmlns:asvg="http://schemas.microsoft.com/office/drawing/2016/SVG/main" r:embed="rId6"/>
+              </a:ext>
+            </a:extLst>
+          </a:blip>
+          <a:stretch>
+            <a:fillRect/>
+          </a:stretch>
+        </a:blipFill>
+      </dgm:spPr>
+      <dgm:extLst>
+        <a:ext uri="{E40237B7-FDA0-4F09-8148-C483321AD2D9}">
+          <dgm14:cNvPr xmlns:dgm14="http://schemas.microsoft.com/office/drawing/2010/diagram" id="0" name="" descr="Flowchart"/>
+        </a:ext>
+      </dgm:extLst>
+    </dgm:pt>
+    <dgm:pt modelId="{735554EA-7D2C-45F5-957B-C9B56127AA0A}" type="pres">
+      <dgm:prSet presAssocID="{7788AC43-B382-454F-B705-8679FA415611}" presName="spaceRect" presStyleCnt="0"/>
+      <dgm:spPr/>
+    </dgm:pt>
+    <dgm:pt modelId="{CC554FC6-3872-4BAE-B212-180FEB9273A3}" type="pres">
+      <dgm:prSet presAssocID="{7788AC43-B382-454F-B705-8679FA415611}" presName="parTx" presStyleLbl="revTx" presStyleIdx="2" presStyleCnt="5">
+        <dgm:presLayoutVars>
+          <dgm:chMax val="0"/>
+          <dgm:chPref val="0"/>
+        </dgm:presLayoutVars>
+      </dgm:prSet>
+      <dgm:spPr/>
+    </dgm:pt>
+    <dgm:pt modelId="{17D636E2-7A4A-464D-AE8F-3EB9BDA8C570}" type="pres">
+      <dgm:prSet presAssocID="{FBB0EA72-FB63-4972-8DBD-8039CF56C96E}" presName="sibTrans" presStyleCnt="0"/>
+      <dgm:spPr/>
+    </dgm:pt>
+    <dgm:pt modelId="{9E2CFB1D-1C37-4C47-BDCC-2CD28EF192B4}" type="pres">
+      <dgm:prSet presAssocID="{4363840F-9B5E-493E-B623-C1CBF64551E9}" presName="compNode" presStyleCnt="0"/>
+      <dgm:spPr/>
+    </dgm:pt>
+    <dgm:pt modelId="{43505058-B66B-42CB-BF49-E3A2DA88A1DC}" type="pres">
+      <dgm:prSet presAssocID="{4363840F-9B5E-493E-B623-C1CBF64551E9}" presName="bgRect" presStyleLbl="bgShp" presStyleIdx="3" presStyleCnt="5"/>
+      <dgm:spPr/>
+    </dgm:pt>
+    <dgm:pt modelId="{4E0491A4-1E2D-49C0-979C-B332278D893B}" type="pres">
+      <dgm:prSet presAssocID="{4363840F-9B5E-493E-B623-C1CBF64551E9}" presName="iconRect" presStyleLbl="node1" presStyleIdx="3" presStyleCnt="5"/>
+      <dgm:spPr>
+        <a:blipFill>
+          <a:blip xmlns:r="http://schemas.openxmlformats.org/officeDocument/2006/relationships" r:embed="rId7">
+            <a:extLst>
+              <a:ext uri="{28A0092B-C50C-407E-A947-70E740481C1C}">
+                <a14:useLocalDpi xmlns:a14="http://schemas.microsoft.com/office/drawing/2010/main" val="0"/>
+              </a:ext>
+              <a:ext uri="{96DAC541-7B7A-43D3-8B79-37D633B846F1}">
+                <asvg:svgBlip xmlns:asvg="http://schemas.microsoft.com/office/drawing/2016/SVG/main" r:embed="rId8"/>
+              </a:ext>
+            </a:extLst>
+          </a:blip>
+          <a:stretch>
+            <a:fillRect/>
+          </a:stretch>
+        </a:blipFill>
+      </dgm:spPr>
+      <dgm:extLst>
+        <a:ext uri="{E40237B7-FDA0-4F09-8148-C483321AD2D9}">
+          <dgm14:cNvPr xmlns:dgm14="http://schemas.microsoft.com/office/drawing/2010/diagram" id="0" name="" descr="Bubbles"/>
+        </a:ext>
+      </dgm:extLst>
+    </dgm:pt>
+    <dgm:pt modelId="{8E370124-23D6-4525-A20B-279E6F90E4CA}" type="pres">
+      <dgm:prSet presAssocID="{4363840F-9B5E-493E-B623-C1CBF64551E9}" presName="spaceRect" presStyleCnt="0"/>
+      <dgm:spPr/>
+    </dgm:pt>
+    <dgm:pt modelId="{1962C85E-D203-4987-B4FF-D6B9E815C36B}" type="pres">
+      <dgm:prSet presAssocID="{4363840F-9B5E-493E-B623-C1CBF64551E9}" presName="parTx" presStyleLbl="revTx" presStyleIdx="3" presStyleCnt="5">
+        <dgm:presLayoutVars>
+          <dgm:chMax val="0"/>
+          <dgm:chPref val="0"/>
+        </dgm:presLayoutVars>
+      </dgm:prSet>
+      <dgm:spPr/>
+    </dgm:pt>
+    <dgm:pt modelId="{7F676A30-B9F0-40EE-AF01-680957D5C901}" type="pres">
+      <dgm:prSet presAssocID="{235AE275-15FC-47B0-85AC-F53847550EED}" presName="sibTrans" presStyleCnt="0"/>
+      <dgm:spPr/>
+    </dgm:pt>
+    <dgm:pt modelId="{D3A3D3F2-E9DF-451C-A903-09F9E3E36FE9}" type="pres">
+      <dgm:prSet presAssocID="{C1C81BA1-DF92-481B-9A6B-37E4A3E5D126}" presName="compNode" presStyleCnt="0"/>
+      <dgm:spPr/>
+    </dgm:pt>
+    <dgm:pt modelId="{60B9CBF8-3A99-4630-925C-C10225FDE2DD}" type="pres">
+      <dgm:prSet presAssocID="{C1C81BA1-DF92-481B-9A6B-37E4A3E5D126}" presName="bgRect" presStyleLbl="bgShp" presStyleIdx="4" presStyleCnt="5"/>
+      <dgm:spPr/>
+    </dgm:pt>
+    <dgm:pt modelId="{360B15B3-3769-4AC7-8E9F-4B02BCFFE484}" type="pres">
+      <dgm:prSet presAssocID="{C1C81BA1-DF92-481B-9A6B-37E4A3E5D126}" presName="iconRect" presStyleLbl="node1" presStyleIdx="4" presStyleCnt="5"/>
+      <dgm:spPr>
+        <a:blipFill>
+          <a:blip xmlns:r="http://schemas.openxmlformats.org/officeDocument/2006/relationships" r:embed="rId9">
+            <a:extLst>
+              <a:ext uri="{28A0092B-C50C-407E-A947-70E740481C1C}">
+                <a14:useLocalDpi xmlns:a14="http://schemas.microsoft.com/office/drawing/2010/main" val="0"/>
+              </a:ext>
+              <a:ext uri="{96DAC541-7B7A-43D3-8B79-37D633B846F1}">
+                <asvg:svgBlip xmlns:asvg="http://schemas.microsoft.com/office/drawing/2016/SVG/main" r:embed="rId10"/>
+              </a:ext>
+            </a:extLst>
+          </a:blip>
+          <a:stretch>
+            <a:fillRect/>
+          </a:stretch>
+        </a:blipFill>
+      </dgm:spPr>
+      <dgm:extLst>
+        <a:ext uri="{E40237B7-FDA0-4F09-8148-C483321AD2D9}">
+          <dgm14:cNvPr xmlns:dgm14="http://schemas.microsoft.com/office/drawing/2010/diagram" id="0" name="" descr="Subtitles"/>
+        </a:ext>
+      </dgm:extLst>
+    </dgm:pt>
+    <dgm:pt modelId="{02764E64-62D3-4973-91C2-1FC11CD68F52}" type="pres">
+      <dgm:prSet presAssocID="{C1C81BA1-DF92-481B-9A6B-37E4A3E5D126}" presName="spaceRect" presStyleCnt="0"/>
+      <dgm:spPr/>
+    </dgm:pt>
+    <dgm:pt modelId="{5DEF701A-F664-49D6-A7CE-FE89DD637C99}" type="pres">
+      <dgm:prSet presAssocID="{C1C81BA1-DF92-481B-9A6B-37E4A3E5D126}" presName="parTx" presStyleLbl="revTx" presStyleIdx="4" presStyleCnt="5">
+        <dgm:presLayoutVars>
+          <dgm:chMax val="0"/>
+          <dgm:chPref val="0"/>
+        </dgm:presLayoutVars>
+      </dgm:prSet>
+      <dgm:spPr/>
+    </dgm:pt>
+  </dgm:ptLst>
+  <dgm:cxnLst>
+    <dgm:cxn modelId="{05EA7D0C-A0C3-414D-9B3B-C60DFBB4B559}" type="presOf" srcId="{7788AC43-B382-454F-B705-8679FA415611}" destId="{CC554FC6-3872-4BAE-B212-180FEB9273A3}" srcOrd="0" destOrd="0" presId="urn:microsoft.com/office/officeart/2018/2/layout/IconVerticalSolidList"/>
+    <dgm:cxn modelId="{A5B42D30-90A0-4487-A425-65A6354CD25D}" type="presOf" srcId="{82C776C0-D9CF-4DAA-8767-C4C9E5DD5F0B}" destId="{C393B845-CB0E-4182-AF6F-D1BE134FF13C}" srcOrd="0" destOrd="0" presId="urn:microsoft.com/office/officeart/2018/2/layout/IconVerticalSolidList"/>
+    <dgm:cxn modelId="{63CA673F-FA2F-4914-8475-78C20F55CE8B}" srcId="{D950E120-AE11-4988-A9BA-1E90C3A9CEE5}" destId="{82C776C0-D9CF-4DAA-8767-C4C9E5DD5F0B}" srcOrd="1" destOrd="0" parTransId="{5852CEF9-F6A4-4AB2-B029-468FC4229C27}" sibTransId="{F8C370E7-1A01-4F64-BABD-5AEC760029AA}"/>
+    <dgm:cxn modelId="{4F90F03F-9E82-4F6E-8C72-70D25FB4281B}" srcId="{D950E120-AE11-4988-A9BA-1E90C3A9CEE5}" destId="{4363840F-9B5E-493E-B623-C1CBF64551E9}" srcOrd="3" destOrd="0" parTransId="{2BE6C7BD-AC5F-4661-84BE-1E4CD75F91B7}" sibTransId="{235AE275-15FC-47B0-85AC-F53847550EED}"/>
+    <dgm:cxn modelId="{0B1FFA4B-CBEC-4349-A83A-0D62C680F1DD}" type="presOf" srcId="{4363840F-9B5E-493E-B623-C1CBF64551E9}" destId="{1962C85E-D203-4987-B4FF-D6B9E815C36B}" srcOrd="0" destOrd="0" presId="urn:microsoft.com/office/officeart/2018/2/layout/IconVerticalSolidList"/>
+    <dgm:cxn modelId="{42E2BD70-DCD9-4FC9-881E-4D1CBCE6C5A3}" srcId="{D950E120-AE11-4988-A9BA-1E90C3A9CEE5}" destId="{7788AC43-B382-454F-B705-8679FA415611}" srcOrd="2" destOrd="0" parTransId="{FD7284DF-F946-4489-B162-6C61619438B1}" sibTransId="{FBB0EA72-FB63-4972-8DBD-8039CF56C96E}"/>
+    <dgm:cxn modelId="{50AB3675-331B-46D7-B00F-5F8041151BF9}" type="presOf" srcId="{C1C81BA1-DF92-481B-9A6B-37E4A3E5D126}" destId="{5DEF701A-F664-49D6-A7CE-FE89DD637C99}" srcOrd="0" destOrd="0" presId="urn:microsoft.com/office/officeart/2018/2/layout/IconVerticalSolidList"/>
+    <dgm:cxn modelId="{E9BA038E-6A61-44E0-A4ED-A3E89667CC00}" type="presOf" srcId="{D950E120-AE11-4988-A9BA-1E90C3A9CEE5}" destId="{6F84AEFE-F266-41B4-9994-4FC97D39A133}" srcOrd="0" destOrd="0" presId="urn:microsoft.com/office/officeart/2018/2/layout/IconVerticalSolidList"/>
+    <dgm:cxn modelId="{E1DA67B4-4B64-4C77-810D-2A0A1000FD2A}" srcId="{D950E120-AE11-4988-A9BA-1E90C3A9CEE5}" destId="{F1B1B249-0782-45B9-A335-69FA2DFFE380}" srcOrd="0" destOrd="0" parTransId="{32EE7E13-D882-4B19-A3A4-32DDBD750DE1}" sibTransId="{60EBFB5C-7A7B-493B-A270-011E3D4EF148}"/>
+    <dgm:cxn modelId="{CAEA6DCA-D81B-4E21-8B1A-A3AE2C6EBF87}" srcId="{D950E120-AE11-4988-A9BA-1E90C3A9CEE5}" destId="{C1C81BA1-DF92-481B-9A6B-37E4A3E5D126}" srcOrd="4" destOrd="0" parTransId="{54BDE39A-D4E6-4577-9665-3021D229A758}" sibTransId="{B8756E9C-878E-46C8-9560-45AC9672162E}"/>
+    <dgm:cxn modelId="{05271FCC-E720-4ACF-BD28-E454D188CB08}" type="presOf" srcId="{F1B1B249-0782-45B9-A335-69FA2DFFE380}" destId="{80321459-9FB9-4652-AE82-23C50B7AC704}" srcOrd="0" destOrd="0" presId="urn:microsoft.com/office/officeart/2018/2/layout/IconVerticalSolidList"/>
+    <dgm:cxn modelId="{107A7A7B-6EBF-4F91-9CBC-01823CC4848C}" type="presParOf" srcId="{6F84AEFE-F266-41B4-9994-4FC97D39A133}" destId="{A2C19D44-A573-4847-B52D-3917AC163C18}" srcOrd="0" destOrd="0" presId="urn:microsoft.com/office/officeart/2018/2/layout/IconVerticalSolidList"/>
+    <dgm:cxn modelId="{95EFB84F-97E0-416E-AD79-AE867F727DEE}" type="presParOf" srcId="{A2C19D44-A573-4847-B52D-3917AC163C18}" destId="{020FA305-92B4-4AE6-9129-A0981EE9A063}" srcOrd="0" destOrd="0" presId="urn:microsoft.com/office/officeart/2018/2/layout/IconVerticalSolidList"/>
+    <dgm:cxn modelId="{29EA5C7A-F245-4D24-9443-552A75588D83}" type="presParOf" srcId="{A2C19D44-A573-4847-B52D-3917AC163C18}" destId="{0C0CE71B-8826-4C57-BC8A-C4B1C2AE2812}" srcOrd="1" destOrd="0" presId="urn:microsoft.com/office/officeart/2018/2/layout/IconVerticalSolidList"/>
+    <dgm:cxn modelId="{B942196C-46CB-445A-B469-4A77EF0806AD}" type="presParOf" srcId="{A2C19D44-A573-4847-B52D-3917AC163C18}" destId="{15438C02-3C04-4262-92F0-1FE3C52BDCB4}" srcOrd="2" destOrd="0" presId="urn:microsoft.com/office/officeart/2018/2/layout/IconVerticalSolidList"/>
+    <dgm:cxn modelId="{C46BD17A-EE3A-4A27-AC25-5727CD4F60C8}" type="presParOf" srcId="{A2C19D44-A573-4847-B52D-3917AC163C18}" destId="{80321459-9FB9-4652-AE82-23C50B7AC704}" srcOrd="3" destOrd="0" presId="urn:microsoft.com/office/officeart/2018/2/layout/IconVerticalSolidList"/>
+    <dgm:cxn modelId="{7C2B03EA-4CBC-42C9-B915-4BC1932691A0}" type="presParOf" srcId="{6F84AEFE-F266-41B4-9994-4FC97D39A133}" destId="{B8FA7C1E-DFA7-4B38-B705-97C7BB107F02}" srcOrd="1" destOrd="0" presId="urn:microsoft.com/office/officeart/2018/2/layout/IconVerticalSolidList"/>
+    <dgm:cxn modelId="{F10DB129-2275-4734-B9F3-356DC9DE37C9}" type="presParOf" srcId="{6F84AEFE-F266-41B4-9994-4FC97D39A133}" destId="{6BA84590-4268-4F07-BF1C-BAF1621E9DB6}" srcOrd="2" destOrd="0" presId="urn:microsoft.com/office/officeart/2018/2/layout/IconVerticalSolidList"/>
+    <dgm:cxn modelId="{CC0A6C84-EEDD-4F7C-BEC8-D5AD7F990D7D}" type="presParOf" srcId="{6BA84590-4268-4F07-BF1C-BAF1621E9DB6}" destId="{FD089904-BDC7-4360-9591-693A63A617DC}" srcOrd="0" destOrd="0" presId="urn:microsoft.com/office/officeart/2018/2/layout/IconVerticalSolidList"/>
+    <dgm:cxn modelId="{80E74E2E-A856-49C6-841D-642B8A0ADB03}" type="presParOf" srcId="{6BA84590-4268-4F07-BF1C-BAF1621E9DB6}" destId="{5710E18B-2407-4DE9-B516-C3F9742A5C1B}" srcOrd="1" destOrd="0" presId="urn:microsoft.com/office/officeart/2018/2/layout/IconVerticalSolidList"/>
+    <dgm:cxn modelId="{682E8B0B-3ECB-4A5F-A55B-C46CC83258D4}" type="presParOf" srcId="{6BA84590-4268-4F07-BF1C-BAF1621E9DB6}" destId="{1F1CBC80-24DA-4AD1-AB5B-9C8B92AAE403}" srcOrd="2" destOrd="0" presId="urn:microsoft.com/office/officeart/2018/2/layout/IconVerticalSolidList"/>
+    <dgm:cxn modelId="{2B2A77C0-2BDD-45B8-8FA6-FF9403FF2EAA}" type="presParOf" srcId="{6BA84590-4268-4F07-BF1C-BAF1621E9DB6}" destId="{C393B845-CB0E-4182-AF6F-D1BE134FF13C}" srcOrd="3" destOrd="0" presId="urn:microsoft.com/office/officeart/2018/2/layout/IconVerticalSolidList"/>
+    <dgm:cxn modelId="{017888C4-8CBA-4F29-A48F-177181537306}" type="presParOf" srcId="{6F84AEFE-F266-41B4-9994-4FC97D39A133}" destId="{B497C2EF-56D2-4FEC-B1C3-D556663E740B}" srcOrd="3" destOrd="0" presId="urn:microsoft.com/office/officeart/2018/2/layout/IconVerticalSolidList"/>
+    <dgm:cxn modelId="{6EB59C68-DCDB-4156-A58E-2B790602E0DE}" type="presParOf" srcId="{6F84AEFE-F266-41B4-9994-4FC97D39A133}" destId="{4F999BF7-2B4C-4B31-887F-200B85033C17}" srcOrd="4" destOrd="0" presId="urn:microsoft.com/office/officeart/2018/2/layout/IconVerticalSolidList"/>
+    <dgm:cxn modelId="{A754A94B-3A47-4058-BCBF-02AFE1DB186A}" type="presParOf" srcId="{4F999BF7-2B4C-4B31-887F-200B85033C17}" destId="{2E206216-BDD5-4C78-89CD-F6269DD4DE2F}" srcOrd="0" destOrd="0" presId="urn:microsoft.com/office/officeart/2018/2/layout/IconVerticalSolidList"/>
+    <dgm:cxn modelId="{11E60773-62B3-4F99-859C-75E5C2AD1A5A}" type="presParOf" srcId="{4F999BF7-2B4C-4B31-887F-200B85033C17}" destId="{B0A85CD9-D0EF-4D4F-976C-506B695CABA9}" srcOrd="1" destOrd="0" presId="urn:microsoft.com/office/officeart/2018/2/layout/IconVerticalSolidList"/>
+    <dgm:cxn modelId="{84E9CB8F-5A2A-4276-8494-E0F298C5157E}" type="presParOf" srcId="{4F999BF7-2B4C-4B31-887F-200B85033C17}" destId="{735554EA-7D2C-45F5-957B-C9B56127AA0A}" srcOrd="2" destOrd="0" presId="urn:microsoft.com/office/officeart/2018/2/layout/IconVerticalSolidList"/>
+    <dgm:cxn modelId="{F26002D8-CB9C-4430-8E5C-0D950AC745FE}" type="presParOf" srcId="{4F999BF7-2B4C-4B31-887F-200B85033C17}" destId="{CC554FC6-3872-4BAE-B212-180FEB9273A3}" srcOrd="3" destOrd="0" presId="urn:microsoft.com/office/officeart/2018/2/layout/IconVerticalSolidList"/>
+    <dgm:cxn modelId="{FB85AFC3-89FB-4460-97C0-9837FDB35592}" type="presParOf" srcId="{6F84AEFE-F266-41B4-9994-4FC97D39A133}" destId="{17D636E2-7A4A-464D-AE8F-3EB9BDA8C570}" srcOrd="5" destOrd="0" presId="urn:microsoft.com/office/officeart/2018/2/layout/IconVerticalSolidList"/>
+    <dgm:cxn modelId="{05A531A9-EB6C-4637-90F1-8843A93CDA8F}" type="presParOf" srcId="{6F84AEFE-F266-41B4-9994-4FC97D39A133}" destId="{9E2CFB1D-1C37-4C47-BDCC-2CD28EF192B4}" srcOrd="6" destOrd="0" presId="urn:microsoft.com/office/officeart/2018/2/layout/IconVerticalSolidList"/>
+    <dgm:cxn modelId="{F74AA565-E6CB-461B-91C9-9E8CEECC01A6}" type="presParOf" srcId="{9E2CFB1D-1C37-4C47-BDCC-2CD28EF192B4}" destId="{43505058-B66B-42CB-BF49-E3A2DA88A1DC}" srcOrd="0" destOrd="0" presId="urn:microsoft.com/office/officeart/2018/2/layout/IconVerticalSolidList"/>
+    <dgm:cxn modelId="{F4814C0A-326A-4C5D-B938-68BFC19A9B69}" type="presParOf" srcId="{9E2CFB1D-1C37-4C47-BDCC-2CD28EF192B4}" destId="{4E0491A4-1E2D-49C0-979C-B332278D893B}" srcOrd="1" destOrd="0" presId="urn:microsoft.com/office/officeart/2018/2/layout/IconVerticalSolidList"/>
+    <dgm:cxn modelId="{96995C3C-8F99-401B-AB03-91E5702E46D6}" type="presParOf" srcId="{9E2CFB1D-1C37-4C47-BDCC-2CD28EF192B4}" destId="{8E370124-23D6-4525-A20B-279E6F90E4CA}" srcOrd="2" destOrd="0" presId="urn:microsoft.com/office/officeart/2018/2/layout/IconVerticalSolidList"/>
+    <dgm:cxn modelId="{24DF9732-9B48-4027-8797-2AF3B790793C}" type="presParOf" srcId="{9E2CFB1D-1C37-4C47-BDCC-2CD28EF192B4}" destId="{1962C85E-D203-4987-B4FF-D6B9E815C36B}" srcOrd="3" destOrd="0" presId="urn:microsoft.com/office/officeart/2018/2/layout/IconVerticalSolidList"/>
+    <dgm:cxn modelId="{794AFBC2-BFE1-4537-B7C3-EC9220FA1100}" type="presParOf" srcId="{6F84AEFE-F266-41B4-9994-4FC97D39A133}" destId="{7F676A30-B9F0-40EE-AF01-680957D5C901}" srcOrd="7" destOrd="0" presId="urn:microsoft.com/office/officeart/2018/2/layout/IconVerticalSolidList"/>
+    <dgm:cxn modelId="{79588221-F593-42EA-BE5F-547DA8C6A7E6}" type="presParOf" srcId="{6F84AEFE-F266-41B4-9994-4FC97D39A133}" destId="{D3A3D3F2-E9DF-451C-A903-09F9E3E36FE9}" srcOrd="8" destOrd="0" presId="urn:microsoft.com/office/officeart/2018/2/layout/IconVerticalSolidList"/>
+    <dgm:cxn modelId="{3F75B976-11DC-4DE3-8A65-917B3BAD11F1}" type="presParOf" srcId="{D3A3D3F2-E9DF-451C-A903-09F9E3E36FE9}" destId="{60B9CBF8-3A99-4630-925C-C10225FDE2DD}" srcOrd="0" destOrd="0" presId="urn:microsoft.com/office/officeart/2018/2/layout/IconVerticalSolidList"/>
+    <dgm:cxn modelId="{7ED306FB-7BD4-414F-81EB-EFB77465F266}" type="presParOf" srcId="{D3A3D3F2-E9DF-451C-A903-09F9E3E36FE9}" destId="{360B15B3-3769-4AC7-8E9F-4B02BCFFE484}" srcOrd="1" destOrd="0" presId="urn:microsoft.com/office/officeart/2018/2/layout/IconVerticalSolidList"/>
+    <dgm:cxn modelId="{7A7DE822-3EC5-47E4-836E-28CE0246E316}" type="presParOf" srcId="{D3A3D3F2-E9DF-451C-A903-09F9E3E36FE9}" destId="{02764E64-62D3-4973-91C2-1FC11CD68F52}" srcOrd="2" destOrd="0" presId="urn:microsoft.com/office/officeart/2018/2/layout/IconVerticalSolidList"/>
+    <dgm:cxn modelId="{CA3E676C-1AB5-466D-9448-EF25CB972444}" type="presParOf" srcId="{D3A3D3F2-E9DF-451C-A903-09F9E3E36FE9}" destId="{5DEF701A-F664-49D6-A7CE-FE89DD637C99}" srcOrd="3" destOrd="0" presId="urn:microsoft.com/office/officeart/2018/2/layout/IconVerticalSolidList"/>
   </dgm:cxnLst>
   <dgm:bg/>
   <dgm:whole/>
@@ -1560,6 +2834,813 @@
 </dsp:drawing>
 </file>
 
+<file path=ppt/diagrams/drawing2.xml><?xml version="1.0" encoding="utf-8"?>
+<dsp:drawing xmlns:dgm="http://schemas.openxmlformats.org/drawingml/2006/diagram" xmlns:dsp="http://schemas.microsoft.com/office/drawing/2008/diagram" xmlns:a="http://schemas.openxmlformats.org/drawingml/2006/main">
+  <dsp:spTree>
+    <dsp:nvGrpSpPr>
+      <dsp:cNvPr id="0" name=""/>
+      <dsp:cNvGrpSpPr/>
+    </dsp:nvGrpSpPr>
+    <dsp:grpSpPr/>
+    <dsp:sp modelId="{020FA305-92B4-4AE6-9129-A0981EE9A063}">
+      <dsp:nvSpPr>
+        <dsp:cNvPr id="0" name=""/>
+        <dsp:cNvSpPr/>
+      </dsp:nvSpPr>
+      <dsp:spPr>
+        <a:xfrm>
+          <a:off x="0" y="3071"/>
+          <a:ext cx="5969653" cy="654296"/>
+        </a:xfrm>
+        <a:prstGeom prst="roundRect">
+          <a:avLst>
+            <a:gd name="adj" fmla="val 10000"/>
+          </a:avLst>
+        </a:prstGeom>
+        <a:solidFill>
+          <a:schemeClr val="accent1">
+            <a:tint val="40000"/>
+            <a:hueOff val="0"/>
+            <a:satOff val="0"/>
+            <a:lumOff val="0"/>
+            <a:alphaOff val="0"/>
+          </a:schemeClr>
+        </a:solidFill>
+        <a:ln>
+          <a:noFill/>
+        </a:ln>
+        <a:effectLst/>
+      </dsp:spPr>
+      <dsp:style>
+        <a:lnRef idx="0">
+          <a:scrgbClr r="0" g="0" b="0"/>
+        </a:lnRef>
+        <a:fillRef idx="1">
+          <a:scrgbClr r="0" g="0" b="0"/>
+        </a:fillRef>
+        <a:effectRef idx="0">
+          <a:scrgbClr r="0" g="0" b="0"/>
+        </a:effectRef>
+        <a:fontRef idx="minor"/>
+      </dsp:style>
+    </dsp:sp>
+    <dsp:sp modelId="{0C0CE71B-8826-4C57-BC8A-C4B1C2AE2812}">
+      <dsp:nvSpPr>
+        <dsp:cNvPr id="0" name=""/>
+        <dsp:cNvSpPr/>
+      </dsp:nvSpPr>
+      <dsp:spPr>
+        <a:xfrm>
+          <a:off x="197924" y="150288"/>
+          <a:ext cx="359862" cy="359862"/>
+        </a:xfrm>
+        <a:prstGeom prst="rect">
+          <a:avLst/>
+        </a:prstGeom>
+        <a:blipFill>
+          <a:blip xmlns:r="http://schemas.openxmlformats.org/officeDocument/2006/relationships" r:embed="rId1">
+            <a:extLst>
+              <a:ext uri="{28A0092B-C50C-407E-A947-70E740481C1C}">
+                <a14:useLocalDpi xmlns:a14="http://schemas.microsoft.com/office/drawing/2010/main" val="0"/>
+              </a:ext>
+              <a:ext uri="{96DAC541-7B7A-43D3-8B79-37D633B846F1}">
+                <asvg:svgBlip xmlns:asvg="http://schemas.microsoft.com/office/drawing/2016/SVG/main" r:embed="rId2"/>
+              </a:ext>
+            </a:extLst>
+          </a:blip>
+          <a:stretch>
+            <a:fillRect/>
+          </a:stretch>
+        </a:blipFill>
+        <a:ln w="12700" cap="flat" cmpd="sng" algn="ctr">
+          <a:solidFill>
+            <a:schemeClr val="lt1">
+              <a:hueOff val="0"/>
+              <a:satOff val="0"/>
+              <a:lumOff val="0"/>
+              <a:alphaOff val="0"/>
+            </a:schemeClr>
+          </a:solidFill>
+          <a:prstDash val="solid"/>
+          <a:miter lim="800000"/>
+        </a:ln>
+        <a:effectLst/>
+      </dsp:spPr>
+      <dsp:style>
+        <a:lnRef idx="2">
+          <a:scrgbClr r="0" g="0" b="0"/>
+        </a:lnRef>
+        <a:fillRef idx="1">
+          <a:scrgbClr r="0" g="0" b="0"/>
+        </a:fillRef>
+        <a:effectRef idx="0">
+          <a:scrgbClr r="0" g="0" b="0"/>
+        </a:effectRef>
+        <a:fontRef idx="minor">
+          <a:schemeClr val="lt1"/>
+        </a:fontRef>
+      </dsp:style>
+    </dsp:sp>
+    <dsp:sp modelId="{80321459-9FB9-4652-AE82-23C50B7AC704}">
+      <dsp:nvSpPr>
+        <dsp:cNvPr id="0" name=""/>
+        <dsp:cNvSpPr/>
+      </dsp:nvSpPr>
+      <dsp:spPr>
+        <a:xfrm>
+          <a:off x="755711" y="3071"/>
+          <a:ext cx="5213941" cy="654296"/>
+        </a:xfrm>
+        <a:prstGeom prst="rect">
+          <a:avLst/>
+        </a:prstGeom>
+        <a:noFill/>
+        <a:ln>
+          <a:noFill/>
+        </a:ln>
+        <a:effectLst/>
+      </dsp:spPr>
+      <dsp:style>
+        <a:lnRef idx="0">
+          <a:scrgbClr r="0" g="0" b="0"/>
+        </a:lnRef>
+        <a:fillRef idx="0">
+          <a:scrgbClr r="0" g="0" b="0"/>
+        </a:fillRef>
+        <a:effectRef idx="0">
+          <a:scrgbClr r="0" g="0" b="0"/>
+        </a:effectRef>
+        <a:fontRef idx="minor"/>
+      </dsp:style>
+      <dsp:txBody>
+        <a:bodyPr spcFirstLastPara="0" vert="horz" wrap="square" lIns="69246" tIns="69246" rIns="69246" bIns="69246" numCol="1" spcCol="1270" anchor="ctr" anchorCtr="0">
+          <a:noAutofit/>
+        </a:bodyPr>
+        <a:lstStyle/>
+        <a:p>
+          <a:pPr marL="0" lvl="0" indent="0" algn="l" defTabSz="844550">
+            <a:lnSpc>
+              <a:spcPct val="100000"/>
+            </a:lnSpc>
+            <a:spcBef>
+              <a:spcPct val="0"/>
+            </a:spcBef>
+            <a:spcAft>
+              <a:spcPct val="35000"/>
+            </a:spcAft>
+            <a:buNone/>
+          </a:pPr>
+          <a:r>
+            <a:rPr lang="en-US" sz="1900" kern="1200"/>
+            <a:t>Lấy tâm (Centroid)</a:t>
+          </a:r>
+        </a:p>
+      </dsp:txBody>
+      <dsp:txXfrm>
+        <a:off x="755711" y="3071"/>
+        <a:ext cx="5213941" cy="654296"/>
+      </dsp:txXfrm>
+    </dsp:sp>
+    <dsp:sp modelId="{FD089904-BDC7-4360-9591-693A63A617DC}">
+      <dsp:nvSpPr>
+        <dsp:cNvPr id="0" name=""/>
+        <dsp:cNvSpPr/>
+      </dsp:nvSpPr>
+      <dsp:spPr>
+        <a:xfrm>
+          <a:off x="0" y="820941"/>
+          <a:ext cx="5969653" cy="654296"/>
+        </a:xfrm>
+        <a:prstGeom prst="roundRect">
+          <a:avLst>
+            <a:gd name="adj" fmla="val 10000"/>
+          </a:avLst>
+        </a:prstGeom>
+        <a:solidFill>
+          <a:schemeClr val="accent1">
+            <a:tint val="40000"/>
+            <a:hueOff val="0"/>
+            <a:satOff val="0"/>
+            <a:lumOff val="0"/>
+            <a:alphaOff val="0"/>
+          </a:schemeClr>
+        </a:solidFill>
+        <a:ln>
+          <a:noFill/>
+        </a:ln>
+        <a:effectLst/>
+      </dsp:spPr>
+      <dsp:style>
+        <a:lnRef idx="0">
+          <a:scrgbClr r="0" g="0" b="0"/>
+        </a:lnRef>
+        <a:fillRef idx="1">
+          <a:scrgbClr r="0" g="0" b="0"/>
+        </a:fillRef>
+        <a:effectRef idx="0">
+          <a:scrgbClr r="0" g="0" b="0"/>
+        </a:effectRef>
+        <a:fontRef idx="minor"/>
+      </dsp:style>
+    </dsp:sp>
+    <dsp:sp modelId="{5710E18B-2407-4DE9-B516-C3F9742A5C1B}">
+      <dsp:nvSpPr>
+        <dsp:cNvPr id="0" name=""/>
+        <dsp:cNvSpPr/>
+      </dsp:nvSpPr>
+      <dsp:spPr>
+        <a:xfrm>
+          <a:off x="197924" y="968158"/>
+          <a:ext cx="359862" cy="359862"/>
+        </a:xfrm>
+        <a:prstGeom prst="rect">
+          <a:avLst/>
+        </a:prstGeom>
+        <a:blipFill>
+          <a:blip xmlns:r="http://schemas.openxmlformats.org/officeDocument/2006/relationships" r:embed="rId3">
+            <a:extLst>
+              <a:ext uri="{28A0092B-C50C-407E-A947-70E740481C1C}">
+                <a14:useLocalDpi xmlns:a14="http://schemas.microsoft.com/office/drawing/2010/main" val="0"/>
+              </a:ext>
+              <a:ext uri="{96DAC541-7B7A-43D3-8B79-37D633B846F1}">
+                <asvg:svgBlip xmlns:asvg="http://schemas.microsoft.com/office/drawing/2016/SVG/main" r:embed="rId4"/>
+              </a:ext>
+            </a:extLst>
+          </a:blip>
+          <a:stretch>
+            <a:fillRect/>
+          </a:stretch>
+        </a:blipFill>
+        <a:ln w="12700" cap="flat" cmpd="sng" algn="ctr">
+          <a:solidFill>
+            <a:schemeClr val="lt1">
+              <a:hueOff val="0"/>
+              <a:satOff val="0"/>
+              <a:lumOff val="0"/>
+              <a:alphaOff val="0"/>
+            </a:schemeClr>
+          </a:solidFill>
+          <a:prstDash val="solid"/>
+          <a:miter lim="800000"/>
+        </a:ln>
+        <a:effectLst/>
+      </dsp:spPr>
+      <dsp:style>
+        <a:lnRef idx="2">
+          <a:scrgbClr r="0" g="0" b="0"/>
+        </a:lnRef>
+        <a:fillRef idx="1">
+          <a:scrgbClr r="0" g="0" b="0"/>
+        </a:fillRef>
+        <a:effectRef idx="0">
+          <a:scrgbClr r="0" g="0" b="0"/>
+        </a:effectRef>
+        <a:fontRef idx="minor">
+          <a:schemeClr val="lt1"/>
+        </a:fontRef>
+      </dsp:style>
+    </dsp:sp>
+    <dsp:sp modelId="{C393B845-CB0E-4182-AF6F-D1BE134FF13C}">
+      <dsp:nvSpPr>
+        <dsp:cNvPr id="0" name=""/>
+        <dsp:cNvSpPr/>
+      </dsp:nvSpPr>
+      <dsp:spPr>
+        <a:xfrm>
+          <a:off x="755711" y="820941"/>
+          <a:ext cx="5213941" cy="654296"/>
+        </a:xfrm>
+        <a:prstGeom prst="rect">
+          <a:avLst/>
+        </a:prstGeom>
+        <a:noFill/>
+        <a:ln>
+          <a:noFill/>
+        </a:ln>
+        <a:effectLst/>
+      </dsp:spPr>
+      <dsp:style>
+        <a:lnRef idx="0">
+          <a:scrgbClr r="0" g="0" b="0"/>
+        </a:lnRef>
+        <a:fillRef idx="0">
+          <a:scrgbClr r="0" g="0" b="0"/>
+        </a:fillRef>
+        <a:effectRef idx="0">
+          <a:scrgbClr r="0" g="0" b="0"/>
+        </a:effectRef>
+        <a:fontRef idx="minor"/>
+      </dsp:style>
+      <dsp:txBody>
+        <a:bodyPr spcFirstLastPara="0" vert="horz" wrap="square" lIns="69246" tIns="69246" rIns="69246" bIns="69246" numCol="1" spcCol="1270" anchor="ctr" anchorCtr="0">
+          <a:noAutofit/>
+        </a:bodyPr>
+        <a:lstStyle/>
+        <a:p>
+          <a:pPr marL="0" lvl="0" indent="0" algn="l" defTabSz="844550">
+            <a:lnSpc>
+              <a:spcPct val="100000"/>
+            </a:lnSpc>
+            <a:spcBef>
+              <a:spcPct val="0"/>
+            </a:spcBef>
+            <a:spcAft>
+              <a:spcPct val="35000"/>
+            </a:spcAft>
+            <a:buNone/>
+          </a:pPr>
+          <a:r>
+            <a:rPr lang="en-US" sz="1900" kern="1200"/>
+            <a:t>Lấy diện tích (Area)</a:t>
+          </a:r>
+        </a:p>
+      </dsp:txBody>
+      <dsp:txXfrm>
+        <a:off x="755711" y="820941"/>
+        <a:ext cx="5213941" cy="654296"/>
+      </dsp:txXfrm>
+    </dsp:sp>
+    <dsp:sp modelId="{2E206216-BDD5-4C78-89CD-F6269DD4DE2F}">
+      <dsp:nvSpPr>
+        <dsp:cNvPr id="0" name=""/>
+        <dsp:cNvSpPr/>
+      </dsp:nvSpPr>
+      <dsp:spPr>
+        <a:xfrm>
+          <a:off x="0" y="1638811"/>
+          <a:ext cx="5969653" cy="654296"/>
+        </a:xfrm>
+        <a:prstGeom prst="roundRect">
+          <a:avLst>
+            <a:gd name="adj" fmla="val 10000"/>
+          </a:avLst>
+        </a:prstGeom>
+        <a:solidFill>
+          <a:schemeClr val="accent1">
+            <a:tint val="40000"/>
+            <a:hueOff val="0"/>
+            <a:satOff val="0"/>
+            <a:lumOff val="0"/>
+            <a:alphaOff val="0"/>
+          </a:schemeClr>
+        </a:solidFill>
+        <a:ln>
+          <a:noFill/>
+        </a:ln>
+        <a:effectLst/>
+      </dsp:spPr>
+      <dsp:style>
+        <a:lnRef idx="0">
+          <a:scrgbClr r="0" g="0" b="0"/>
+        </a:lnRef>
+        <a:fillRef idx="1">
+          <a:scrgbClr r="0" g="0" b="0"/>
+        </a:fillRef>
+        <a:effectRef idx="0">
+          <a:scrgbClr r="0" g="0" b="0"/>
+        </a:effectRef>
+        <a:fontRef idx="minor"/>
+      </dsp:style>
+    </dsp:sp>
+    <dsp:sp modelId="{B0A85CD9-D0EF-4D4F-976C-506B695CABA9}">
+      <dsp:nvSpPr>
+        <dsp:cNvPr id="0" name=""/>
+        <dsp:cNvSpPr/>
+      </dsp:nvSpPr>
+      <dsp:spPr>
+        <a:xfrm>
+          <a:off x="197924" y="1786028"/>
+          <a:ext cx="359862" cy="359862"/>
+        </a:xfrm>
+        <a:prstGeom prst="rect">
+          <a:avLst/>
+        </a:prstGeom>
+        <a:blipFill>
+          <a:blip xmlns:r="http://schemas.openxmlformats.org/officeDocument/2006/relationships" r:embed="rId5">
+            <a:extLst>
+              <a:ext uri="{28A0092B-C50C-407E-A947-70E740481C1C}">
+                <a14:useLocalDpi xmlns:a14="http://schemas.microsoft.com/office/drawing/2010/main" val="0"/>
+              </a:ext>
+              <a:ext uri="{96DAC541-7B7A-43D3-8B79-37D633B846F1}">
+                <asvg:svgBlip xmlns:asvg="http://schemas.microsoft.com/office/drawing/2016/SVG/main" r:embed="rId6"/>
+              </a:ext>
+            </a:extLst>
+          </a:blip>
+          <a:stretch>
+            <a:fillRect/>
+          </a:stretch>
+        </a:blipFill>
+        <a:ln w="12700" cap="flat" cmpd="sng" algn="ctr">
+          <a:solidFill>
+            <a:schemeClr val="lt1">
+              <a:hueOff val="0"/>
+              <a:satOff val="0"/>
+              <a:lumOff val="0"/>
+              <a:alphaOff val="0"/>
+            </a:schemeClr>
+          </a:solidFill>
+          <a:prstDash val="solid"/>
+          <a:miter lim="800000"/>
+        </a:ln>
+        <a:effectLst/>
+      </dsp:spPr>
+      <dsp:style>
+        <a:lnRef idx="2">
+          <a:scrgbClr r="0" g="0" b="0"/>
+        </a:lnRef>
+        <a:fillRef idx="1">
+          <a:scrgbClr r="0" g="0" b="0"/>
+        </a:fillRef>
+        <a:effectRef idx="0">
+          <a:scrgbClr r="0" g="0" b="0"/>
+        </a:effectRef>
+        <a:fontRef idx="minor">
+          <a:schemeClr val="lt1"/>
+        </a:fontRef>
+      </dsp:style>
+    </dsp:sp>
+    <dsp:sp modelId="{CC554FC6-3872-4BAE-B212-180FEB9273A3}">
+      <dsp:nvSpPr>
+        <dsp:cNvPr id="0" name=""/>
+        <dsp:cNvSpPr/>
+      </dsp:nvSpPr>
+      <dsp:spPr>
+        <a:xfrm>
+          <a:off x="755711" y="1638811"/>
+          <a:ext cx="5213941" cy="654296"/>
+        </a:xfrm>
+        <a:prstGeom prst="rect">
+          <a:avLst/>
+        </a:prstGeom>
+        <a:noFill/>
+        <a:ln>
+          <a:noFill/>
+        </a:ln>
+        <a:effectLst/>
+      </dsp:spPr>
+      <dsp:style>
+        <a:lnRef idx="0">
+          <a:scrgbClr r="0" g="0" b="0"/>
+        </a:lnRef>
+        <a:fillRef idx="0">
+          <a:scrgbClr r="0" g="0" b="0"/>
+        </a:fillRef>
+        <a:effectRef idx="0">
+          <a:scrgbClr r="0" g="0" b="0"/>
+        </a:effectRef>
+        <a:fontRef idx="minor"/>
+      </dsp:style>
+      <dsp:txBody>
+        <a:bodyPr spcFirstLastPara="0" vert="horz" wrap="square" lIns="69246" tIns="69246" rIns="69246" bIns="69246" numCol="1" spcCol="1270" anchor="ctr" anchorCtr="0">
+          <a:noAutofit/>
+        </a:bodyPr>
+        <a:lstStyle/>
+        <a:p>
+          <a:pPr marL="0" lvl="0" indent="0" algn="l" defTabSz="844550">
+            <a:lnSpc>
+              <a:spcPct val="100000"/>
+            </a:lnSpc>
+            <a:spcBef>
+              <a:spcPct val="0"/>
+            </a:spcBef>
+            <a:spcAft>
+              <a:spcPct val="35000"/>
+            </a:spcAft>
+            <a:buNone/>
+          </a:pPr>
+          <a:r>
+            <a:rPr lang="en-US" sz="1900" kern="1200"/>
+            <a:t>Kiểm tra điểm chứa trong (IsInside)</a:t>
+          </a:r>
+        </a:p>
+      </dsp:txBody>
+      <dsp:txXfrm>
+        <a:off x="755711" y="1638811"/>
+        <a:ext cx="5213941" cy="654296"/>
+      </dsp:txXfrm>
+    </dsp:sp>
+    <dsp:sp modelId="{43505058-B66B-42CB-BF49-E3A2DA88A1DC}">
+      <dsp:nvSpPr>
+        <dsp:cNvPr id="0" name=""/>
+        <dsp:cNvSpPr/>
+      </dsp:nvSpPr>
+      <dsp:spPr>
+        <a:xfrm>
+          <a:off x="0" y="2456682"/>
+          <a:ext cx="5969653" cy="654296"/>
+        </a:xfrm>
+        <a:prstGeom prst="roundRect">
+          <a:avLst>
+            <a:gd name="adj" fmla="val 10000"/>
+          </a:avLst>
+        </a:prstGeom>
+        <a:solidFill>
+          <a:schemeClr val="accent1">
+            <a:tint val="40000"/>
+            <a:hueOff val="0"/>
+            <a:satOff val="0"/>
+            <a:lumOff val="0"/>
+            <a:alphaOff val="0"/>
+          </a:schemeClr>
+        </a:solidFill>
+        <a:ln>
+          <a:noFill/>
+        </a:ln>
+        <a:effectLst/>
+      </dsp:spPr>
+      <dsp:style>
+        <a:lnRef idx="0">
+          <a:scrgbClr r="0" g="0" b="0"/>
+        </a:lnRef>
+        <a:fillRef idx="1">
+          <a:scrgbClr r="0" g="0" b="0"/>
+        </a:fillRef>
+        <a:effectRef idx="0">
+          <a:scrgbClr r="0" g="0" b="0"/>
+        </a:effectRef>
+        <a:fontRef idx="minor"/>
+      </dsp:style>
+    </dsp:sp>
+    <dsp:sp modelId="{4E0491A4-1E2D-49C0-979C-B332278D893B}">
+      <dsp:nvSpPr>
+        <dsp:cNvPr id="0" name=""/>
+        <dsp:cNvSpPr/>
+      </dsp:nvSpPr>
+      <dsp:spPr>
+        <a:xfrm>
+          <a:off x="197924" y="2603898"/>
+          <a:ext cx="359862" cy="359862"/>
+        </a:xfrm>
+        <a:prstGeom prst="rect">
+          <a:avLst/>
+        </a:prstGeom>
+        <a:blipFill>
+          <a:blip xmlns:r="http://schemas.openxmlformats.org/officeDocument/2006/relationships" r:embed="rId7">
+            <a:extLst>
+              <a:ext uri="{28A0092B-C50C-407E-A947-70E740481C1C}">
+                <a14:useLocalDpi xmlns:a14="http://schemas.microsoft.com/office/drawing/2010/main" val="0"/>
+              </a:ext>
+              <a:ext uri="{96DAC541-7B7A-43D3-8B79-37D633B846F1}">
+                <asvg:svgBlip xmlns:asvg="http://schemas.microsoft.com/office/drawing/2016/SVG/main" r:embed="rId8"/>
+              </a:ext>
+            </a:extLst>
+          </a:blip>
+          <a:stretch>
+            <a:fillRect/>
+          </a:stretch>
+        </a:blipFill>
+        <a:ln w="12700" cap="flat" cmpd="sng" algn="ctr">
+          <a:solidFill>
+            <a:schemeClr val="lt1">
+              <a:hueOff val="0"/>
+              <a:satOff val="0"/>
+              <a:lumOff val="0"/>
+              <a:alphaOff val="0"/>
+            </a:schemeClr>
+          </a:solidFill>
+          <a:prstDash val="solid"/>
+          <a:miter lim="800000"/>
+        </a:ln>
+        <a:effectLst/>
+      </dsp:spPr>
+      <dsp:style>
+        <a:lnRef idx="2">
+          <a:scrgbClr r="0" g="0" b="0"/>
+        </a:lnRef>
+        <a:fillRef idx="1">
+          <a:scrgbClr r="0" g="0" b="0"/>
+        </a:fillRef>
+        <a:effectRef idx="0">
+          <a:scrgbClr r="0" g="0" b="0"/>
+        </a:effectRef>
+        <a:fontRef idx="minor">
+          <a:schemeClr val="lt1"/>
+        </a:fontRef>
+      </dsp:style>
+    </dsp:sp>
+    <dsp:sp modelId="{1962C85E-D203-4987-B4FF-D6B9E815C36B}">
+      <dsp:nvSpPr>
+        <dsp:cNvPr id="0" name=""/>
+        <dsp:cNvSpPr/>
+      </dsp:nvSpPr>
+      <dsp:spPr>
+        <a:xfrm>
+          <a:off x="755711" y="2456682"/>
+          <a:ext cx="5213941" cy="654296"/>
+        </a:xfrm>
+        <a:prstGeom prst="rect">
+          <a:avLst/>
+        </a:prstGeom>
+        <a:noFill/>
+        <a:ln>
+          <a:noFill/>
+        </a:ln>
+        <a:effectLst/>
+      </dsp:spPr>
+      <dsp:style>
+        <a:lnRef idx="0">
+          <a:scrgbClr r="0" g="0" b="0"/>
+        </a:lnRef>
+        <a:fillRef idx="0">
+          <a:scrgbClr r="0" g="0" b="0"/>
+        </a:fillRef>
+        <a:effectRef idx="0">
+          <a:scrgbClr r="0" g="0" b="0"/>
+        </a:effectRef>
+        <a:fontRef idx="minor"/>
+      </dsp:style>
+      <dsp:txBody>
+        <a:bodyPr spcFirstLastPara="0" vert="horz" wrap="square" lIns="69246" tIns="69246" rIns="69246" bIns="69246" numCol="1" spcCol="1270" anchor="ctr" anchorCtr="0">
+          <a:noAutofit/>
+        </a:bodyPr>
+        <a:lstStyle/>
+        <a:p>
+          <a:pPr marL="0" lvl="0" indent="0" algn="l" defTabSz="844550">
+            <a:lnSpc>
+              <a:spcPct val="100000"/>
+            </a:lnSpc>
+            <a:spcBef>
+              <a:spcPct val="0"/>
+            </a:spcBef>
+            <a:spcAft>
+              <a:spcPct val="35000"/>
+            </a:spcAft>
+            <a:buNone/>
+          </a:pPr>
+          <a:r>
+            <a:rPr lang="en-US" sz="1900" kern="1200"/>
+            <a:t>Vẽ Viền (draw)</a:t>
+          </a:r>
+        </a:p>
+      </dsp:txBody>
+      <dsp:txXfrm>
+        <a:off x="755711" y="2456682"/>
+        <a:ext cx="5213941" cy="654296"/>
+      </dsp:txXfrm>
+    </dsp:sp>
+    <dsp:sp modelId="{60B9CBF8-3A99-4630-925C-C10225FDE2DD}">
+      <dsp:nvSpPr>
+        <dsp:cNvPr id="0" name=""/>
+        <dsp:cNvSpPr/>
+      </dsp:nvSpPr>
+      <dsp:spPr>
+        <a:xfrm>
+          <a:off x="0" y="3274552"/>
+          <a:ext cx="5969653" cy="654296"/>
+        </a:xfrm>
+        <a:prstGeom prst="roundRect">
+          <a:avLst>
+            <a:gd name="adj" fmla="val 10000"/>
+          </a:avLst>
+        </a:prstGeom>
+        <a:solidFill>
+          <a:schemeClr val="accent1">
+            <a:tint val="40000"/>
+            <a:hueOff val="0"/>
+            <a:satOff val="0"/>
+            <a:lumOff val="0"/>
+            <a:alphaOff val="0"/>
+          </a:schemeClr>
+        </a:solidFill>
+        <a:ln>
+          <a:noFill/>
+        </a:ln>
+        <a:effectLst/>
+      </dsp:spPr>
+      <dsp:style>
+        <a:lnRef idx="0">
+          <a:scrgbClr r="0" g="0" b="0"/>
+        </a:lnRef>
+        <a:fillRef idx="1">
+          <a:scrgbClr r="0" g="0" b="0"/>
+        </a:fillRef>
+        <a:effectRef idx="0">
+          <a:scrgbClr r="0" g="0" b="0"/>
+        </a:effectRef>
+        <a:fontRef idx="minor"/>
+      </dsp:style>
+    </dsp:sp>
+    <dsp:sp modelId="{360B15B3-3769-4AC7-8E9F-4B02BCFFE484}">
+      <dsp:nvSpPr>
+        <dsp:cNvPr id="0" name=""/>
+        <dsp:cNvSpPr/>
+      </dsp:nvSpPr>
+      <dsp:spPr>
+        <a:xfrm>
+          <a:off x="197924" y="3421768"/>
+          <a:ext cx="359862" cy="359862"/>
+        </a:xfrm>
+        <a:prstGeom prst="rect">
+          <a:avLst/>
+        </a:prstGeom>
+        <a:blipFill>
+          <a:blip xmlns:r="http://schemas.openxmlformats.org/officeDocument/2006/relationships" r:embed="rId9">
+            <a:extLst>
+              <a:ext uri="{28A0092B-C50C-407E-A947-70E740481C1C}">
+                <a14:useLocalDpi xmlns:a14="http://schemas.microsoft.com/office/drawing/2010/main" val="0"/>
+              </a:ext>
+              <a:ext uri="{96DAC541-7B7A-43D3-8B79-37D633B846F1}">
+                <asvg:svgBlip xmlns:asvg="http://schemas.microsoft.com/office/drawing/2016/SVG/main" r:embed="rId10"/>
+              </a:ext>
+            </a:extLst>
+          </a:blip>
+          <a:stretch>
+            <a:fillRect/>
+          </a:stretch>
+        </a:blipFill>
+        <a:ln w="12700" cap="flat" cmpd="sng" algn="ctr">
+          <a:solidFill>
+            <a:schemeClr val="lt1">
+              <a:hueOff val="0"/>
+              <a:satOff val="0"/>
+              <a:lumOff val="0"/>
+              <a:alphaOff val="0"/>
+            </a:schemeClr>
+          </a:solidFill>
+          <a:prstDash val="solid"/>
+          <a:miter lim="800000"/>
+        </a:ln>
+        <a:effectLst/>
+      </dsp:spPr>
+      <dsp:style>
+        <a:lnRef idx="2">
+          <a:scrgbClr r="0" g="0" b="0"/>
+        </a:lnRef>
+        <a:fillRef idx="1">
+          <a:scrgbClr r="0" g="0" b="0"/>
+        </a:fillRef>
+        <a:effectRef idx="0">
+          <a:scrgbClr r="0" g="0" b="0"/>
+        </a:effectRef>
+        <a:fontRef idx="minor">
+          <a:schemeClr val="lt1"/>
+        </a:fontRef>
+      </dsp:style>
+    </dsp:sp>
+    <dsp:sp modelId="{5DEF701A-F664-49D6-A7CE-FE89DD637C99}">
+      <dsp:nvSpPr>
+        <dsp:cNvPr id="0" name=""/>
+        <dsp:cNvSpPr/>
+      </dsp:nvSpPr>
+      <dsp:spPr>
+        <a:xfrm>
+          <a:off x="755711" y="3274552"/>
+          <a:ext cx="5213941" cy="654296"/>
+        </a:xfrm>
+        <a:prstGeom prst="rect">
+          <a:avLst/>
+        </a:prstGeom>
+        <a:noFill/>
+        <a:ln>
+          <a:noFill/>
+        </a:ln>
+        <a:effectLst/>
+      </dsp:spPr>
+      <dsp:style>
+        <a:lnRef idx="0">
+          <a:scrgbClr r="0" g="0" b="0"/>
+        </a:lnRef>
+        <a:fillRef idx="0">
+          <a:scrgbClr r="0" g="0" b="0"/>
+        </a:fillRef>
+        <a:effectRef idx="0">
+          <a:scrgbClr r="0" g="0" b="0"/>
+        </a:effectRef>
+        <a:fontRef idx="minor"/>
+      </dsp:style>
+      <dsp:txBody>
+        <a:bodyPr spcFirstLastPara="0" vert="horz" wrap="square" lIns="69246" tIns="69246" rIns="69246" bIns="69246" numCol="1" spcCol="1270" anchor="ctr" anchorCtr="0">
+          <a:noAutofit/>
+        </a:bodyPr>
+        <a:lstStyle/>
+        <a:p>
+          <a:pPr marL="0" lvl="0" indent="0" algn="l" defTabSz="844550">
+            <a:lnSpc>
+              <a:spcPct val="100000"/>
+            </a:lnSpc>
+            <a:spcBef>
+              <a:spcPct val="0"/>
+            </a:spcBef>
+            <a:spcAft>
+              <a:spcPct val="35000"/>
+            </a:spcAft>
+            <a:buNone/>
+          </a:pPr>
+          <a:r>
+            <a:rPr lang="en-US" sz="1900" kern="1200"/>
+            <a:t>Tô nền (fill)</a:t>
+          </a:r>
+        </a:p>
+      </dsp:txBody>
+      <dsp:txXfrm>
+        <a:off x="755711" y="3274552"/>
+        <a:ext cx="5213941" cy="654296"/>
+      </dsp:txXfrm>
+    </dsp:sp>
+  </dsp:spTree>
+</dsp:drawing>
+</file>
+
 <file path=ppt/diagrams/layout1.xml><?xml version="1.0" encoding="utf-8"?>
 <dgm:layoutDef xmlns:dgm="http://schemas.openxmlformats.org/drawingml/2006/diagram" xmlns:a="http://schemas.openxmlformats.org/drawingml/2006/main" uniqueId="urn:microsoft.com/office/officeart/2019/1/layout/PeoplePortraitsList">
   <dgm:title val="People Portrait List"/>
@@ -1839,7 +3920,1335 @@
 </dgm:layoutDef>
 </file>
 
+<file path=ppt/diagrams/layout2.xml><?xml version="1.0" encoding="utf-8"?>
+<dgm:layoutDef xmlns:dgm="http://schemas.openxmlformats.org/drawingml/2006/diagram" xmlns:a="http://schemas.openxmlformats.org/drawingml/2006/main" uniqueId="urn:microsoft.com/office/officeart/2018/2/layout/IconVerticalSolidList">
+  <dgm:title val="Icon Vertical Solid List"/>
+  <dgm:desc val="Use to show a series of visuals from top to bottom with Level 1 or Level 1 and Level 2 text grouped in a shape. Works best with icons or small pictures with lengthier descriptions."/>
+  <dgm:catLst>
+    <dgm:cat type="icon" pri="500"/>
+  </dgm:catLst>
+  <dgm:sampData useDef="1">
+    <dgm:dataModel>
+      <dgm:ptLst/>
+      <dgm:bg/>
+      <dgm:whole/>
+    </dgm:dataModel>
+  </dgm:sampData>
+  <dgm:styleData useDef="1">
+    <dgm:dataModel>
+      <dgm:ptLst/>
+      <dgm:bg/>
+      <dgm:whole/>
+    </dgm:dataModel>
+  </dgm:styleData>
+  <dgm:clrData useDef="1">
+    <dgm:dataModel>
+      <dgm:ptLst/>
+      <dgm:bg/>
+      <dgm:whole/>
+    </dgm:dataModel>
+  </dgm:clrData>
+  <dgm:layoutNode name="root">
+    <dgm:varLst>
+      <dgm:dir/>
+      <dgm:resizeHandles val="exact"/>
+    </dgm:varLst>
+    <dgm:choose name="Name0">
+      <dgm:if name="Name1" axis="self" func="var" arg="dir" op="equ" val="norm">
+        <dgm:alg type="lin">
+          <dgm:param type="linDir" val="fromT"/>
+          <dgm:param type="nodeHorzAlign" val="l"/>
+        </dgm:alg>
+      </dgm:if>
+      <dgm:else name="Name2">
+        <dgm:alg type="lin">
+          <dgm:param type="linDir" val="fromT"/>
+          <dgm:param type="nodeHorzAlign" val="r"/>
+        </dgm:alg>
+      </dgm:else>
+    </dgm:choose>
+    <dgm:shape xmlns:r="http://schemas.openxmlformats.org/officeDocument/2006/relationships" r:blip="">
+      <dgm:adjLst/>
+    </dgm:shape>
+    <dgm:presOf/>
+    <dgm:choose name="Name3">
+      <dgm:if name="Name4" axis="ch" ptType="node" func="cnt" op="lte" val="3">
+        <dgm:constrLst>
+          <dgm:constr type="h" for="ch" forName="compNode" refType="h" fact="0.3"/>
+          <dgm:constr type="w" for="ch" forName="compNode" refType="w"/>
+          <dgm:constr type="h" for="ch" forName="sibTrans" refType="h" refFor="ch" refForName="compNode" fact="0.25"/>
+          <dgm:constr type="primFontSz" for="des" forName="parTx" val="25"/>
+          <dgm:constr type="primFontSz" for="des" forName="desTx" refType="primFontSz" refFor="des" refForName="parTx" op="lte" fact="0.75"/>
+          <dgm:constr type="h" for="des" forName="compNode" op="equ"/>
+          <dgm:constr type="h" for="des" forName="bgRect" op="equ"/>
+          <dgm:constr type="h" for="des" forName="iconRect" op="equ"/>
+          <dgm:constr type="w" for="des" forName="iconRect" op="equ"/>
+          <dgm:constr type="h" for="des" forName="spaceRect" op="equ"/>
+          <dgm:constr type="h" for="des" forName="parTx" op="equ"/>
+          <dgm:constr type="h" for="des" forName="desTx" op="equ"/>
+        </dgm:constrLst>
+      </dgm:if>
+      <dgm:if name="Name5" axis="ch" ptType="node" func="cnt" op="lte" val="4">
+        <dgm:constrLst>
+          <dgm:constr type="h" for="ch" forName="compNode" refType="h" fact="0.3"/>
+          <dgm:constr type="w" for="ch" forName="compNode" refType="w"/>
+          <dgm:constr type="h" for="ch" forName="sibTrans" refType="h" refFor="ch" refForName="compNode" fact="0.25"/>
+          <dgm:constr type="primFontSz" for="des" forName="parTx" val="22"/>
+          <dgm:constr type="primFontSz" for="des" forName="desTx" refType="primFontSz" refFor="des" refForName="parTx" op="lte" fact="0.75"/>
+          <dgm:constr type="h" for="des" forName="compNode" op="equ"/>
+          <dgm:constr type="h" for="des" forName="bgRect" op="equ"/>
+          <dgm:constr type="h" for="des" forName="iconRect" op="equ"/>
+          <dgm:constr type="w" for="des" forName="iconRect" op="equ"/>
+          <dgm:constr type="h" for="des" forName="spaceRect" op="equ"/>
+          <dgm:constr type="h" for="des" forName="parTx" op="equ"/>
+          <dgm:constr type="h" for="des" forName="desTx" op="equ"/>
+        </dgm:constrLst>
+      </dgm:if>
+      <dgm:if name="Name6" axis="ch" ptType="node" func="cnt" op="lte" val="6">
+        <dgm:constrLst>
+          <dgm:constr type="h" for="ch" forName="compNode" refType="h" fact="0.3"/>
+          <dgm:constr type="w" for="ch" forName="compNode" refType="w"/>
+          <dgm:constr type="h" for="ch" forName="sibTrans" refType="h" refFor="ch" refForName="compNode" fact="0.25"/>
+          <dgm:constr type="primFontSz" for="des" forName="parTx" val="19"/>
+          <dgm:constr type="primFontSz" for="des" forName="desTx" refType="primFontSz" refFor="des" refForName="parTx" op="lte" fact="0.75"/>
+          <dgm:constr type="h" for="des" forName="compNode" op="equ"/>
+          <dgm:constr type="h" for="des" forName="bgRect" op="equ"/>
+          <dgm:constr type="h" for="des" forName="iconRect" op="equ"/>
+          <dgm:constr type="w" for="des" forName="iconRect" op="equ"/>
+          <dgm:constr type="h" for="des" forName="spaceRect" op="equ"/>
+          <dgm:constr type="h" for="des" forName="parTx" op="equ"/>
+          <dgm:constr type="h" for="des" forName="desTx" op="equ"/>
+        </dgm:constrLst>
+      </dgm:if>
+      <dgm:else name="Name7">
+        <dgm:constrLst>
+          <dgm:constr type="h" for="ch" forName="compNode" refType="h" fact="0.3"/>
+          <dgm:constr type="w" for="ch" forName="compNode" refType="w"/>
+          <dgm:constr type="h" for="ch" forName="sibTrans" refType="h" refFor="ch" refForName="compNode" fact="0.25"/>
+          <dgm:constr type="primFontSz" for="des" forName="parTx" val="16"/>
+          <dgm:constr type="primFontSz" for="des" forName="desTx" refType="primFontSz" refFor="des" refForName="parTx" op="lte" fact="0.75"/>
+          <dgm:constr type="h" for="des" forName="compNode" op="equ"/>
+          <dgm:constr type="h" for="des" forName="bgRect" op="equ"/>
+          <dgm:constr type="h" for="des" forName="iconRect" op="equ"/>
+          <dgm:constr type="w" for="des" forName="iconRect" op="equ"/>
+          <dgm:constr type="h" for="des" forName="spaceRect" op="equ"/>
+          <dgm:constr type="h" for="des" forName="parTx" op="equ"/>
+          <dgm:constr type="h" for="des" forName="desTx" op="equ"/>
+        </dgm:constrLst>
+      </dgm:else>
+    </dgm:choose>
+    <dgm:ruleLst>
+      <dgm:rule type="h" for="ch" forName="compNode" val="0" fact="NaN" max="NaN"/>
+    </dgm:ruleLst>
+    <dgm:forEach name="Name8" axis="ch" ptType="node">
+      <dgm:layoutNode name="compNode">
+        <dgm:alg type="composite"/>
+        <dgm:shape xmlns:r="http://schemas.openxmlformats.org/officeDocument/2006/relationships" r:blip="">
+          <dgm:adjLst/>
+        </dgm:shape>
+        <dgm:presOf axis="self"/>
+        <dgm:choose name="Name9">
+          <dgm:if name="Name10" axis="ch" ptType="node" func="cnt" op="gte" val="1">
+            <dgm:constrLst>
+              <dgm:constr type="w" for="ch" forName="bgRect" refType="w"/>
+              <dgm:constr type="h" for="ch" forName="bgRect" refType="h"/>
+              <dgm:constr type="l" for="ch" forName="bgRect"/>
+              <dgm:constr type="t" for="ch" forName="bgRect"/>
+              <dgm:constr type="h" for="ch" forName="iconRect" refType="h" fact="0.55"/>
+              <dgm:constr type="w" for="ch" forName="iconRect" refType="h" refFor="ch" refForName="iconRect"/>
+              <dgm:constr type="l" for="ch" forName="iconRect" refType="h" refFor="ch" refForName="iconRect" fact="0.55"/>
+              <dgm:constr type="ctrY" for="ch" forName="iconRect" refType="ctrY" refFor="ch" refForName="bgRect"/>
+              <dgm:constr type="w" for="ch" forName="spaceRect" refType="l" refFor="ch" refForName="iconRect"/>
+              <dgm:constr type="h" for="ch" forName="spaceRect" refType="h"/>
+              <dgm:constr type="l" for="ch" forName="spaceRect" refType="r" refFor="ch" refForName="iconRect"/>
+              <dgm:constr type="t" for="ch" forName="spaceRect"/>
+              <dgm:constr type="w" for="ch" forName="parTx" refType="w" fact="0.45"/>
+              <dgm:constr type="h" for="ch" forName="parTx" refType="h"/>
+              <dgm:constr type="l" for="ch" forName="parTx" refType="r" refFor="ch" refForName="spaceRect"/>
+              <dgm:constr type="t" for="ch" forName="parTx"/>
+              <dgm:constr type="h" for="ch" forName="desTx" refType="h"/>
+              <dgm:constr type="l" for="ch" forName="desTx" refType="r" refFor="ch" refForName="parTx"/>
+              <dgm:constr type="t" for="ch" forName="desTx"/>
+            </dgm:constrLst>
+          </dgm:if>
+          <dgm:else name="Name11">
+            <dgm:constrLst>
+              <dgm:constr type="w" for="ch" forName="bgRect" refType="w"/>
+              <dgm:constr type="h" for="ch" forName="bgRect" refType="h"/>
+              <dgm:constr type="l" for="ch" forName="bgRect"/>
+              <dgm:constr type="t" for="ch" forName="bgRect"/>
+              <dgm:constr type="h" for="ch" forName="iconRect" refType="h" fact="0.55"/>
+              <dgm:constr type="w" for="ch" forName="iconRect" refType="h" refFor="ch" refForName="iconRect"/>
+              <dgm:constr type="l" for="ch" forName="iconRect" refType="h" refFor="ch" refForName="iconRect" fact="0.55"/>
+              <dgm:constr type="ctrY" for="ch" forName="iconRect" refType="ctrY" refFor="ch" refForName="bgRect"/>
+              <dgm:constr type="w" for="ch" forName="spaceRect" refType="l" refFor="ch" refForName="iconRect"/>
+              <dgm:constr type="h" for="ch" forName="spaceRect" refType="h"/>
+              <dgm:constr type="l" for="ch" forName="spaceRect" refType="r" refFor="ch" refForName="iconRect"/>
+              <dgm:constr type="t" for="ch" forName="spaceRect"/>
+              <dgm:constr type="h" for="ch" forName="parTx" refType="h"/>
+              <dgm:constr type="l" for="ch" forName="parTx" refType="r" refFor="ch" refForName="spaceRect"/>
+              <dgm:constr type="t" for="ch" forName="parTx"/>
+            </dgm:constrLst>
+          </dgm:else>
+        </dgm:choose>
+        <dgm:ruleLst>
+          <dgm:rule type="h" val="INF" fact="NaN" max="NaN"/>
+        </dgm:ruleLst>
+        <dgm:layoutNode name="bgRect" styleLbl="bgShp">
+          <dgm:alg type="sp"/>
+          <dgm:shape xmlns:r="http://schemas.openxmlformats.org/officeDocument/2006/relationships" type="roundRect" r:blip="">
+            <dgm:adjLst>
+              <dgm:adj idx="1" val="0.1"/>
+            </dgm:adjLst>
+          </dgm:shape>
+          <dgm:presOf/>
+          <dgm:constrLst/>
+          <dgm:ruleLst/>
+        </dgm:layoutNode>
+        <dgm:layoutNode name="iconRect" styleLbl="node1">
+          <dgm:alg type="sp"/>
+          <dgm:shape xmlns:r="http://schemas.openxmlformats.org/officeDocument/2006/relationships" type="rect" r:blip="" blipPhldr="1">
+            <dgm:adjLst/>
+          </dgm:shape>
+          <dgm:presOf/>
+          <dgm:constrLst/>
+          <dgm:ruleLst/>
+        </dgm:layoutNode>
+        <dgm:layoutNode name="spaceRect">
+          <dgm:alg type="sp"/>
+          <dgm:shape xmlns:r="http://schemas.openxmlformats.org/officeDocument/2006/relationships" r:blip="">
+            <dgm:adjLst/>
+          </dgm:shape>
+          <dgm:presOf/>
+          <dgm:constrLst/>
+          <dgm:ruleLst/>
+        </dgm:layoutNode>
+        <dgm:layoutNode name="parTx" styleLbl="revTx">
+          <dgm:varLst>
+            <dgm:chMax val="0"/>
+            <dgm:chPref val="0"/>
+          </dgm:varLst>
+          <dgm:alg type="tx">
+            <dgm:param type="txAnchorVert" val="mid"/>
+            <dgm:param type="parTxLTRAlign" val="l"/>
+            <dgm:param type="shpTxLTRAlignCh" val="l"/>
+            <dgm:param type="parTxRTLAlign" val="r"/>
+            <dgm:param type="shpTxRTLAlignCh" val="r"/>
+          </dgm:alg>
+          <dgm:shape xmlns:r="http://schemas.openxmlformats.org/officeDocument/2006/relationships" type="rect" r:blip="">
+            <dgm:adjLst/>
+          </dgm:shape>
+          <dgm:presOf axis="self" ptType="node"/>
+          <dgm:constrLst>
+            <dgm:constr type="lMarg" refType="h" fact="0.3"/>
+            <dgm:constr type="rMarg" refType="h" fact="0.3"/>
+            <dgm:constr type="tMarg" refType="h" fact="0.3"/>
+            <dgm:constr type="bMarg" refType="h" fact="0.3"/>
+          </dgm:constrLst>
+          <dgm:ruleLst>
+            <dgm:rule type="primFontSz" val="14" fact="NaN" max="NaN"/>
+            <dgm:rule type="h" val="INF" fact="NaN" max="NaN"/>
+          </dgm:ruleLst>
+        </dgm:layoutNode>
+        <dgm:choose name="Name12">
+          <dgm:if name="Name13" axis="ch" ptType="node" func="cnt" op="gte" val="1">
+            <dgm:layoutNode name="desTx" styleLbl="revTx">
+              <dgm:varLst/>
+              <dgm:alg type="tx">
+                <dgm:param type="txAnchorVertCh" val="mid"/>
+                <dgm:param type="parTxLTRAlign" val="l"/>
+                <dgm:param type="shpTxLTRAlignCh" val="l"/>
+                <dgm:param type="parTxRTLAlign" val="r"/>
+                <dgm:param type="shpTxRTLAlignCh" val="r"/>
+                <dgm:param type="stBulletLvl" val="0"/>
+              </dgm:alg>
+              <dgm:shape xmlns:r="http://schemas.openxmlformats.org/officeDocument/2006/relationships" type="rect" r:blip="">
+                <dgm:adjLst/>
+              </dgm:shape>
+              <dgm:presOf axis="des" ptType="node"/>
+              <dgm:constrLst>
+                <dgm:constr type="primFontSz" val="18"/>
+                <dgm:constr type="secFontSz" refType="primFontSz"/>
+                <dgm:constr type="lMarg" refType="h" fact="0.3"/>
+                <dgm:constr type="rMarg" refType="h" fact="0.3"/>
+                <dgm:constr type="tMarg" refType="h" fact="0.3"/>
+                <dgm:constr type="bMarg" refType="h" fact="0.3"/>
+              </dgm:constrLst>
+              <dgm:ruleLst>
+                <dgm:rule type="primFontSz" val="11" fact="NaN" max="NaN"/>
+              </dgm:ruleLst>
+            </dgm:layoutNode>
+          </dgm:if>
+          <dgm:else name="Name14"/>
+        </dgm:choose>
+      </dgm:layoutNode>
+      <dgm:forEach name="Name15" axis="followSib" ptType="sibTrans" cnt="1">
+        <dgm:layoutNode name="sibTrans">
+          <dgm:alg type="sp"/>
+          <dgm:shape xmlns:r="http://schemas.openxmlformats.org/officeDocument/2006/relationships" r:blip="">
+            <dgm:adjLst/>
+          </dgm:shape>
+          <dgm:presOf axis="self"/>
+          <dgm:constrLst/>
+          <dgm:ruleLst/>
+        </dgm:layoutNode>
+      </dgm:forEach>
+    </dgm:forEach>
+  </dgm:layoutNode>
+  <dgm:extLst>
+    <a:ext uri="{68A01E43-0DF5-4B5B-8FA6-DAF915123BFB}">
+      <dgm1612:lstStyle xmlns:dgm1612="http://schemas.microsoft.com/office/drawing/2016/12/diagram">
+        <a:lvl1pPr>
+          <a:lnSpc>
+            <a:spcPct val="100000"/>
+          </a:lnSpc>
+        </a:lvl1pPr>
+        <a:lvl2pPr>
+          <a:lnSpc>
+            <a:spcPct val="100000"/>
+          </a:lnSpc>
+        </a:lvl2pPr>
+      </dgm1612:lstStyle>
+    </a:ext>
+  </dgm:extLst>
+</dgm:layoutDef>
+</file>
+
 <file path=ppt/diagrams/quickStyle1.xml><?xml version="1.0" encoding="utf-8"?>
+<dgm:styleDef xmlns:dgm="http://schemas.openxmlformats.org/drawingml/2006/diagram" xmlns:a="http://schemas.openxmlformats.org/drawingml/2006/main" uniqueId="urn:microsoft.com/office/officeart/2005/8/quickstyle/simple1">
+  <dgm:title val=""/>
+  <dgm:desc val=""/>
+  <dgm:catLst>
+    <dgm:cat type="simple" pri="10100"/>
+  </dgm:catLst>
+  <dgm:scene3d>
+    <a:camera prst="orthographicFront"/>
+    <a:lightRig rig="threePt" dir="t"/>
+  </dgm:scene3d>
+  <dgm:styleLbl name="node0">
+    <dgm:scene3d>
+      <a:camera prst="orthographicFront"/>
+      <a:lightRig rig="threePt" dir="t"/>
+    </dgm:scene3d>
+    <dgm:sp3d/>
+    <dgm:txPr/>
+    <dgm:style>
+      <a:lnRef idx="2">
+        <a:scrgbClr r="0" g="0" b="0"/>
+      </a:lnRef>
+      <a:fillRef idx="1">
+        <a:scrgbClr r="0" g="0" b="0"/>
+      </a:fillRef>
+      <a:effectRef idx="0">
+        <a:scrgbClr r="0" g="0" b="0"/>
+      </a:effectRef>
+      <a:fontRef idx="minor">
+        <a:schemeClr val="lt1"/>
+      </a:fontRef>
+    </dgm:style>
+  </dgm:styleLbl>
+  <dgm:styleLbl name="lnNode1">
+    <dgm:scene3d>
+      <a:camera prst="orthographicFront"/>
+      <a:lightRig rig="threePt" dir="t"/>
+    </dgm:scene3d>
+    <dgm:sp3d/>
+    <dgm:txPr/>
+    <dgm:style>
+      <a:lnRef idx="2">
+        <a:scrgbClr r="0" g="0" b="0"/>
+      </a:lnRef>
+      <a:fillRef idx="1">
+        <a:scrgbClr r="0" g="0" b="0"/>
+      </a:fillRef>
+      <a:effectRef idx="0">
+        <a:scrgbClr r="0" g="0" b="0"/>
+      </a:effectRef>
+      <a:fontRef idx="minor">
+        <a:schemeClr val="lt1"/>
+      </a:fontRef>
+    </dgm:style>
+  </dgm:styleLbl>
+  <dgm:styleLbl name="vennNode1">
+    <dgm:scene3d>
+      <a:camera prst="orthographicFront"/>
+      <a:lightRig rig="threePt" dir="t"/>
+    </dgm:scene3d>
+    <dgm:sp3d/>
+    <dgm:txPr/>
+    <dgm:style>
+      <a:lnRef idx="2">
+        <a:scrgbClr r="0" g="0" b="0"/>
+      </a:lnRef>
+      <a:fillRef idx="1">
+        <a:scrgbClr r="0" g="0" b="0"/>
+      </a:fillRef>
+      <a:effectRef idx="0">
+        <a:scrgbClr r="0" g="0" b="0"/>
+      </a:effectRef>
+      <a:fontRef idx="minor">
+        <a:schemeClr val="tx1"/>
+      </a:fontRef>
+    </dgm:style>
+  </dgm:styleLbl>
+  <dgm:styleLbl name="alignNode1">
+    <dgm:scene3d>
+      <a:camera prst="orthographicFront"/>
+      <a:lightRig rig="threePt" dir="t"/>
+    </dgm:scene3d>
+    <dgm:sp3d/>
+    <dgm:txPr/>
+    <dgm:style>
+      <a:lnRef idx="2">
+        <a:scrgbClr r="0" g="0" b="0"/>
+      </a:lnRef>
+      <a:fillRef idx="1">
+        <a:scrgbClr r="0" g="0" b="0"/>
+      </a:fillRef>
+      <a:effectRef idx="0">
+        <a:scrgbClr r="0" g="0" b="0"/>
+      </a:effectRef>
+      <a:fontRef idx="minor">
+        <a:schemeClr val="lt1"/>
+      </a:fontRef>
+    </dgm:style>
+  </dgm:styleLbl>
+  <dgm:styleLbl name="node1">
+    <dgm:scene3d>
+      <a:camera prst="orthographicFront"/>
+      <a:lightRig rig="threePt" dir="t"/>
+    </dgm:scene3d>
+    <dgm:sp3d/>
+    <dgm:txPr/>
+    <dgm:style>
+      <a:lnRef idx="2">
+        <a:scrgbClr r="0" g="0" b="0"/>
+      </a:lnRef>
+      <a:fillRef idx="1">
+        <a:scrgbClr r="0" g="0" b="0"/>
+      </a:fillRef>
+      <a:effectRef idx="0">
+        <a:scrgbClr r="0" g="0" b="0"/>
+      </a:effectRef>
+      <a:fontRef idx="minor">
+        <a:schemeClr val="lt1"/>
+      </a:fontRef>
+    </dgm:style>
+  </dgm:styleLbl>
+  <dgm:styleLbl name="node2">
+    <dgm:scene3d>
+      <a:camera prst="orthographicFront"/>
+      <a:lightRig rig="threePt" dir="t"/>
+    </dgm:scene3d>
+    <dgm:sp3d/>
+    <dgm:txPr/>
+    <dgm:style>
+      <a:lnRef idx="2">
+        <a:scrgbClr r="0" g="0" b="0"/>
+      </a:lnRef>
+      <a:fillRef idx="1">
+        <a:scrgbClr r="0" g="0" b="0"/>
+      </a:fillRef>
+      <a:effectRef idx="0">
+        <a:scrgbClr r="0" g="0" b="0"/>
+      </a:effectRef>
+      <a:fontRef idx="minor">
+        <a:schemeClr val="lt1"/>
+      </a:fontRef>
+    </dgm:style>
+  </dgm:styleLbl>
+  <dgm:styleLbl name="node3">
+    <dgm:scene3d>
+      <a:camera prst="orthographicFront"/>
+      <a:lightRig rig="threePt" dir="t"/>
+    </dgm:scene3d>
+    <dgm:sp3d/>
+    <dgm:txPr/>
+    <dgm:style>
+      <a:lnRef idx="2">
+        <a:scrgbClr r="0" g="0" b="0"/>
+      </a:lnRef>
+      <a:fillRef idx="1">
+        <a:scrgbClr r="0" g="0" b="0"/>
+      </a:fillRef>
+      <a:effectRef idx="0">
+        <a:scrgbClr r="0" g="0" b="0"/>
+      </a:effectRef>
+      <a:fontRef idx="minor">
+        <a:schemeClr val="lt1"/>
+      </a:fontRef>
+    </dgm:style>
+  </dgm:styleLbl>
+  <dgm:styleLbl name="node4">
+    <dgm:scene3d>
+      <a:camera prst="orthographicFront"/>
+      <a:lightRig rig="threePt" dir="t"/>
+    </dgm:scene3d>
+    <dgm:sp3d/>
+    <dgm:txPr/>
+    <dgm:style>
+      <a:lnRef idx="2">
+        <a:scrgbClr r="0" g="0" b="0"/>
+      </a:lnRef>
+      <a:fillRef idx="1">
+        <a:scrgbClr r="0" g="0" b="0"/>
+      </a:fillRef>
+      <a:effectRef idx="0">
+        <a:scrgbClr r="0" g="0" b="0"/>
+      </a:effectRef>
+      <a:fontRef idx="minor">
+        <a:schemeClr val="lt1"/>
+      </a:fontRef>
+    </dgm:style>
+  </dgm:styleLbl>
+  <dgm:styleLbl name="fgImgPlace1">
+    <dgm:scene3d>
+      <a:camera prst="orthographicFront"/>
+      <a:lightRig rig="threePt" dir="t"/>
+    </dgm:scene3d>
+    <dgm:sp3d/>
+    <dgm:txPr/>
+    <dgm:style>
+      <a:lnRef idx="2">
+        <a:scrgbClr r="0" g="0" b="0"/>
+      </a:lnRef>
+      <a:fillRef idx="1">
+        <a:scrgbClr r="0" g="0" b="0"/>
+      </a:fillRef>
+      <a:effectRef idx="0">
+        <a:scrgbClr r="0" g="0" b="0"/>
+      </a:effectRef>
+      <a:fontRef idx="minor"/>
+    </dgm:style>
+  </dgm:styleLbl>
+  <dgm:styleLbl name="alignImgPlace1">
+    <dgm:scene3d>
+      <a:camera prst="orthographicFront"/>
+      <a:lightRig rig="threePt" dir="t"/>
+    </dgm:scene3d>
+    <dgm:sp3d/>
+    <dgm:txPr/>
+    <dgm:style>
+      <a:lnRef idx="2">
+        <a:scrgbClr r="0" g="0" b="0"/>
+      </a:lnRef>
+      <a:fillRef idx="1">
+        <a:scrgbClr r="0" g="0" b="0"/>
+      </a:fillRef>
+      <a:effectRef idx="0">
+        <a:scrgbClr r="0" g="0" b="0"/>
+      </a:effectRef>
+      <a:fontRef idx="minor"/>
+    </dgm:style>
+  </dgm:styleLbl>
+  <dgm:styleLbl name="bgImgPlace1">
+    <dgm:scene3d>
+      <a:camera prst="orthographicFront"/>
+      <a:lightRig rig="threePt" dir="t"/>
+    </dgm:scene3d>
+    <dgm:sp3d/>
+    <dgm:txPr/>
+    <dgm:style>
+      <a:lnRef idx="2">
+        <a:scrgbClr r="0" g="0" b="0"/>
+      </a:lnRef>
+      <a:fillRef idx="1">
+        <a:scrgbClr r="0" g="0" b="0"/>
+      </a:fillRef>
+      <a:effectRef idx="0">
+        <a:scrgbClr r="0" g="0" b="0"/>
+      </a:effectRef>
+      <a:fontRef idx="minor"/>
+    </dgm:style>
+  </dgm:styleLbl>
+  <dgm:styleLbl name="sibTrans2D1">
+    <dgm:scene3d>
+      <a:camera prst="orthographicFront"/>
+      <a:lightRig rig="threePt" dir="t"/>
+    </dgm:scene3d>
+    <dgm:sp3d/>
+    <dgm:txPr/>
+    <dgm:style>
+      <a:lnRef idx="0">
+        <a:scrgbClr r="0" g="0" b="0"/>
+      </a:lnRef>
+      <a:fillRef idx="1">
+        <a:scrgbClr r="0" g="0" b="0"/>
+      </a:fillRef>
+      <a:effectRef idx="0">
+        <a:scrgbClr r="0" g="0" b="0"/>
+      </a:effectRef>
+      <a:fontRef idx="minor">
+        <a:schemeClr val="lt1"/>
+      </a:fontRef>
+    </dgm:style>
+  </dgm:styleLbl>
+  <dgm:styleLbl name="fgSibTrans2D1">
+    <dgm:scene3d>
+      <a:camera prst="orthographicFront"/>
+      <a:lightRig rig="threePt" dir="t"/>
+    </dgm:scene3d>
+    <dgm:sp3d/>
+    <dgm:txPr/>
+    <dgm:style>
+      <a:lnRef idx="0">
+        <a:scrgbClr r="0" g="0" b="0"/>
+      </a:lnRef>
+      <a:fillRef idx="1">
+        <a:scrgbClr r="0" g="0" b="0"/>
+      </a:fillRef>
+      <a:effectRef idx="0">
+        <a:scrgbClr r="0" g="0" b="0"/>
+      </a:effectRef>
+      <a:fontRef idx="minor">
+        <a:schemeClr val="lt1"/>
+      </a:fontRef>
+    </dgm:style>
+  </dgm:styleLbl>
+  <dgm:styleLbl name="bgSibTrans2D1">
+    <dgm:scene3d>
+      <a:camera prst="orthographicFront"/>
+      <a:lightRig rig="threePt" dir="t"/>
+    </dgm:scene3d>
+    <dgm:sp3d/>
+    <dgm:txPr/>
+    <dgm:style>
+      <a:lnRef idx="0">
+        <a:scrgbClr r="0" g="0" b="0"/>
+      </a:lnRef>
+      <a:fillRef idx="1">
+        <a:scrgbClr r="0" g="0" b="0"/>
+      </a:fillRef>
+      <a:effectRef idx="0">
+        <a:scrgbClr r="0" g="0" b="0"/>
+      </a:effectRef>
+      <a:fontRef idx="minor">
+        <a:schemeClr val="lt1"/>
+      </a:fontRef>
+    </dgm:style>
+  </dgm:styleLbl>
+  <dgm:styleLbl name="sibTrans1D1">
+    <dgm:scene3d>
+      <a:camera prst="orthographicFront"/>
+      <a:lightRig rig="threePt" dir="t"/>
+    </dgm:scene3d>
+    <dgm:sp3d/>
+    <dgm:txPr/>
+    <dgm:style>
+      <a:lnRef idx="1">
+        <a:scrgbClr r="0" g="0" b="0"/>
+      </a:lnRef>
+      <a:fillRef idx="0">
+        <a:scrgbClr r="0" g="0" b="0"/>
+      </a:fillRef>
+      <a:effectRef idx="0">
+        <a:scrgbClr r="0" g="0" b="0"/>
+      </a:effectRef>
+      <a:fontRef idx="minor"/>
+    </dgm:style>
+  </dgm:styleLbl>
+  <dgm:styleLbl name="callout">
+    <dgm:scene3d>
+      <a:camera prst="orthographicFront"/>
+      <a:lightRig rig="threePt" dir="t"/>
+    </dgm:scene3d>
+    <dgm:sp3d/>
+    <dgm:txPr/>
+    <dgm:style>
+      <a:lnRef idx="2">
+        <a:scrgbClr r="0" g="0" b="0"/>
+      </a:lnRef>
+      <a:fillRef idx="1">
+        <a:scrgbClr r="0" g="0" b="0"/>
+      </a:fillRef>
+      <a:effectRef idx="0">
+        <a:scrgbClr r="0" g="0" b="0"/>
+      </a:effectRef>
+      <a:fontRef idx="minor"/>
+    </dgm:style>
+  </dgm:styleLbl>
+  <dgm:styleLbl name="asst0">
+    <dgm:scene3d>
+      <a:camera prst="orthographicFront"/>
+      <a:lightRig rig="threePt" dir="t"/>
+    </dgm:scene3d>
+    <dgm:sp3d/>
+    <dgm:txPr/>
+    <dgm:style>
+      <a:lnRef idx="2">
+        <a:scrgbClr r="0" g="0" b="0"/>
+      </a:lnRef>
+      <a:fillRef idx="1">
+        <a:scrgbClr r="0" g="0" b="0"/>
+      </a:fillRef>
+      <a:effectRef idx="0">
+        <a:scrgbClr r="0" g="0" b="0"/>
+      </a:effectRef>
+      <a:fontRef idx="minor">
+        <a:schemeClr val="lt1"/>
+      </a:fontRef>
+    </dgm:style>
+  </dgm:styleLbl>
+  <dgm:styleLbl name="asst1">
+    <dgm:scene3d>
+      <a:camera prst="orthographicFront"/>
+      <a:lightRig rig="threePt" dir="t"/>
+    </dgm:scene3d>
+    <dgm:sp3d/>
+    <dgm:txPr/>
+    <dgm:style>
+      <a:lnRef idx="2">
+        <a:scrgbClr r="0" g="0" b="0"/>
+      </a:lnRef>
+      <a:fillRef idx="1">
+        <a:scrgbClr r="0" g="0" b="0"/>
+      </a:fillRef>
+      <a:effectRef idx="0">
+        <a:scrgbClr r="0" g="0" b="0"/>
+      </a:effectRef>
+      <a:fontRef idx="minor">
+        <a:schemeClr val="lt1"/>
+      </a:fontRef>
+    </dgm:style>
+  </dgm:styleLbl>
+  <dgm:styleLbl name="asst2">
+    <dgm:scene3d>
+      <a:camera prst="orthographicFront"/>
+      <a:lightRig rig="threePt" dir="t"/>
+    </dgm:scene3d>
+    <dgm:sp3d/>
+    <dgm:txPr/>
+    <dgm:style>
+      <a:lnRef idx="2">
+        <a:scrgbClr r="0" g="0" b="0"/>
+      </a:lnRef>
+      <a:fillRef idx="1">
+        <a:scrgbClr r="0" g="0" b="0"/>
+      </a:fillRef>
+      <a:effectRef idx="0">
+        <a:scrgbClr r="0" g="0" b="0"/>
+      </a:effectRef>
+      <a:fontRef idx="minor">
+        <a:schemeClr val="lt1"/>
+      </a:fontRef>
+    </dgm:style>
+  </dgm:styleLbl>
+  <dgm:styleLbl name="asst3">
+    <dgm:scene3d>
+      <a:camera prst="orthographicFront"/>
+      <a:lightRig rig="threePt" dir="t"/>
+    </dgm:scene3d>
+    <dgm:sp3d/>
+    <dgm:txPr/>
+    <dgm:style>
+      <a:lnRef idx="2">
+        <a:scrgbClr r="0" g="0" b="0"/>
+      </a:lnRef>
+      <a:fillRef idx="1">
+        <a:scrgbClr r="0" g="0" b="0"/>
+      </a:fillRef>
+      <a:effectRef idx="0">
+        <a:scrgbClr r="0" g="0" b="0"/>
+      </a:effectRef>
+      <a:fontRef idx="minor">
+        <a:schemeClr val="lt1"/>
+      </a:fontRef>
+    </dgm:style>
+  </dgm:styleLbl>
+  <dgm:styleLbl name="asst4">
+    <dgm:scene3d>
+      <a:camera prst="orthographicFront"/>
+      <a:lightRig rig="threePt" dir="t"/>
+    </dgm:scene3d>
+    <dgm:sp3d/>
+    <dgm:txPr/>
+    <dgm:style>
+      <a:lnRef idx="2">
+        <a:scrgbClr r="0" g="0" b="0"/>
+      </a:lnRef>
+      <a:fillRef idx="1">
+        <a:scrgbClr r="0" g="0" b="0"/>
+      </a:fillRef>
+      <a:effectRef idx="0">
+        <a:scrgbClr r="0" g="0" b="0"/>
+      </a:effectRef>
+      <a:fontRef idx="minor">
+        <a:schemeClr val="lt1"/>
+      </a:fontRef>
+    </dgm:style>
+  </dgm:styleLbl>
+  <dgm:styleLbl name="parChTrans2D1">
+    <dgm:scene3d>
+      <a:camera prst="orthographicFront"/>
+      <a:lightRig rig="threePt" dir="t"/>
+    </dgm:scene3d>
+    <dgm:sp3d/>
+    <dgm:txPr/>
+    <dgm:style>
+      <a:lnRef idx="2">
+        <a:scrgbClr r="0" g="0" b="0"/>
+      </a:lnRef>
+      <a:fillRef idx="1">
+        <a:scrgbClr r="0" g="0" b="0"/>
+      </a:fillRef>
+      <a:effectRef idx="0">
+        <a:scrgbClr r="0" g="0" b="0"/>
+      </a:effectRef>
+      <a:fontRef idx="minor">
+        <a:schemeClr val="lt1"/>
+      </a:fontRef>
+    </dgm:style>
+  </dgm:styleLbl>
+  <dgm:styleLbl name="parChTrans2D2">
+    <dgm:scene3d>
+      <a:camera prst="orthographicFront"/>
+      <a:lightRig rig="threePt" dir="t"/>
+    </dgm:scene3d>
+    <dgm:sp3d/>
+    <dgm:txPr/>
+    <dgm:style>
+      <a:lnRef idx="2">
+        <a:scrgbClr r="0" g="0" b="0"/>
+      </a:lnRef>
+      <a:fillRef idx="1">
+        <a:scrgbClr r="0" g="0" b="0"/>
+      </a:fillRef>
+      <a:effectRef idx="0">
+        <a:scrgbClr r="0" g="0" b="0"/>
+      </a:effectRef>
+      <a:fontRef idx="minor">
+        <a:schemeClr val="lt1"/>
+      </a:fontRef>
+    </dgm:style>
+  </dgm:styleLbl>
+  <dgm:styleLbl name="parChTrans2D3">
+    <dgm:scene3d>
+      <a:camera prst="orthographicFront"/>
+      <a:lightRig rig="threePt" dir="t"/>
+    </dgm:scene3d>
+    <dgm:sp3d/>
+    <dgm:txPr/>
+    <dgm:style>
+      <a:lnRef idx="2">
+        <a:scrgbClr r="0" g="0" b="0"/>
+      </a:lnRef>
+      <a:fillRef idx="1">
+        <a:scrgbClr r="0" g="0" b="0"/>
+      </a:fillRef>
+      <a:effectRef idx="0">
+        <a:scrgbClr r="0" g="0" b="0"/>
+      </a:effectRef>
+      <a:fontRef idx="minor">
+        <a:schemeClr val="lt1"/>
+      </a:fontRef>
+    </dgm:style>
+  </dgm:styleLbl>
+  <dgm:styleLbl name="parChTrans2D4">
+    <dgm:scene3d>
+      <a:camera prst="orthographicFront"/>
+      <a:lightRig rig="threePt" dir="t"/>
+    </dgm:scene3d>
+    <dgm:sp3d/>
+    <dgm:txPr/>
+    <dgm:style>
+      <a:lnRef idx="2">
+        <a:scrgbClr r="0" g="0" b="0"/>
+      </a:lnRef>
+      <a:fillRef idx="1">
+        <a:scrgbClr r="0" g="0" b="0"/>
+      </a:fillRef>
+      <a:effectRef idx="0">
+        <a:scrgbClr r="0" g="0" b="0"/>
+      </a:effectRef>
+      <a:fontRef idx="minor">
+        <a:schemeClr val="lt1"/>
+      </a:fontRef>
+    </dgm:style>
+  </dgm:styleLbl>
+  <dgm:styleLbl name="parChTrans1D1">
+    <dgm:scene3d>
+      <a:camera prst="orthographicFront"/>
+      <a:lightRig rig="threePt" dir="t"/>
+    </dgm:scene3d>
+    <dgm:sp3d/>
+    <dgm:txPr/>
+    <dgm:style>
+      <a:lnRef idx="2">
+        <a:scrgbClr r="0" g="0" b="0"/>
+      </a:lnRef>
+      <a:fillRef idx="0">
+        <a:scrgbClr r="0" g="0" b="0"/>
+      </a:fillRef>
+      <a:effectRef idx="0">
+        <a:scrgbClr r="0" g="0" b="0"/>
+      </a:effectRef>
+      <a:fontRef idx="minor"/>
+    </dgm:style>
+  </dgm:styleLbl>
+  <dgm:styleLbl name="parChTrans1D2">
+    <dgm:scene3d>
+      <a:camera prst="orthographicFront"/>
+      <a:lightRig rig="threePt" dir="t"/>
+    </dgm:scene3d>
+    <dgm:sp3d/>
+    <dgm:txPr/>
+    <dgm:style>
+      <a:lnRef idx="2">
+        <a:scrgbClr r="0" g="0" b="0"/>
+      </a:lnRef>
+      <a:fillRef idx="0">
+        <a:scrgbClr r="0" g="0" b="0"/>
+      </a:fillRef>
+      <a:effectRef idx="0">
+        <a:scrgbClr r="0" g="0" b="0"/>
+      </a:effectRef>
+      <a:fontRef idx="minor"/>
+    </dgm:style>
+  </dgm:styleLbl>
+  <dgm:styleLbl name="parChTrans1D3">
+    <dgm:scene3d>
+      <a:camera prst="orthographicFront"/>
+      <a:lightRig rig="threePt" dir="t"/>
+    </dgm:scene3d>
+    <dgm:sp3d/>
+    <dgm:txPr/>
+    <dgm:style>
+      <a:lnRef idx="2">
+        <a:scrgbClr r="0" g="0" b="0"/>
+      </a:lnRef>
+      <a:fillRef idx="0">
+        <a:scrgbClr r="0" g="0" b="0"/>
+      </a:fillRef>
+      <a:effectRef idx="0">
+        <a:scrgbClr r="0" g="0" b="0"/>
+      </a:effectRef>
+      <a:fontRef idx="minor"/>
+    </dgm:style>
+  </dgm:styleLbl>
+  <dgm:styleLbl name="parChTrans1D4">
+    <dgm:scene3d>
+      <a:camera prst="orthographicFront"/>
+      <a:lightRig rig="threePt" dir="t"/>
+    </dgm:scene3d>
+    <dgm:sp3d/>
+    <dgm:txPr/>
+    <dgm:style>
+      <a:lnRef idx="2">
+        <a:scrgbClr r="0" g="0" b="0"/>
+      </a:lnRef>
+      <a:fillRef idx="0">
+        <a:scrgbClr r="0" g="0" b="0"/>
+      </a:fillRef>
+      <a:effectRef idx="0">
+        <a:scrgbClr r="0" g="0" b="0"/>
+      </a:effectRef>
+      <a:fontRef idx="minor"/>
+    </dgm:style>
+  </dgm:styleLbl>
+  <dgm:styleLbl name="fgAcc1">
+    <dgm:scene3d>
+      <a:camera prst="orthographicFront"/>
+      <a:lightRig rig="threePt" dir="t"/>
+    </dgm:scene3d>
+    <dgm:sp3d/>
+    <dgm:txPr/>
+    <dgm:style>
+      <a:lnRef idx="2">
+        <a:scrgbClr r="0" g="0" b="0"/>
+      </a:lnRef>
+      <a:fillRef idx="1">
+        <a:scrgbClr r="0" g="0" b="0"/>
+      </a:fillRef>
+      <a:effectRef idx="0">
+        <a:scrgbClr r="0" g="0" b="0"/>
+      </a:effectRef>
+      <a:fontRef idx="minor"/>
+    </dgm:style>
+  </dgm:styleLbl>
+  <dgm:styleLbl name="conFgAcc1">
+    <dgm:scene3d>
+      <a:camera prst="orthographicFront"/>
+      <a:lightRig rig="threePt" dir="t"/>
+    </dgm:scene3d>
+    <dgm:sp3d/>
+    <dgm:txPr/>
+    <dgm:style>
+      <a:lnRef idx="2">
+        <a:scrgbClr r="0" g="0" b="0"/>
+      </a:lnRef>
+      <a:fillRef idx="1">
+        <a:scrgbClr r="0" g="0" b="0"/>
+      </a:fillRef>
+      <a:effectRef idx="0">
+        <a:scrgbClr r="0" g="0" b="0"/>
+      </a:effectRef>
+      <a:fontRef idx="minor"/>
+    </dgm:style>
+  </dgm:styleLbl>
+  <dgm:styleLbl name="alignAcc1">
+    <dgm:scene3d>
+      <a:camera prst="orthographicFront"/>
+      <a:lightRig rig="threePt" dir="t"/>
+    </dgm:scene3d>
+    <dgm:sp3d/>
+    <dgm:txPr/>
+    <dgm:style>
+      <a:lnRef idx="2">
+        <a:scrgbClr r="0" g="0" b="0"/>
+      </a:lnRef>
+      <a:fillRef idx="1">
+        <a:scrgbClr r="0" g="0" b="0"/>
+      </a:fillRef>
+      <a:effectRef idx="0">
+        <a:scrgbClr r="0" g="0" b="0"/>
+      </a:effectRef>
+      <a:fontRef idx="minor"/>
+    </dgm:style>
+  </dgm:styleLbl>
+  <dgm:styleLbl name="trAlignAcc1">
+    <dgm:scene3d>
+      <a:camera prst="orthographicFront"/>
+      <a:lightRig rig="threePt" dir="t"/>
+    </dgm:scene3d>
+    <dgm:sp3d/>
+    <dgm:txPr/>
+    <dgm:style>
+      <a:lnRef idx="1">
+        <a:scrgbClr r="0" g="0" b="0"/>
+      </a:lnRef>
+      <a:fillRef idx="1">
+        <a:scrgbClr r="0" g="0" b="0"/>
+      </a:fillRef>
+      <a:effectRef idx="0">
+        <a:scrgbClr r="0" g="0" b="0"/>
+      </a:effectRef>
+      <a:fontRef idx="minor"/>
+    </dgm:style>
+  </dgm:styleLbl>
+  <dgm:styleLbl name="bgAcc1">
+    <dgm:scene3d>
+      <a:camera prst="orthographicFront"/>
+      <a:lightRig rig="threePt" dir="t"/>
+    </dgm:scene3d>
+    <dgm:sp3d/>
+    <dgm:txPr/>
+    <dgm:style>
+      <a:lnRef idx="2">
+        <a:scrgbClr r="0" g="0" b="0"/>
+      </a:lnRef>
+      <a:fillRef idx="1">
+        <a:scrgbClr r="0" g="0" b="0"/>
+      </a:fillRef>
+      <a:effectRef idx="0">
+        <a:scrgbClr r="0" g="0" b="0"/>
+      </a:effectRef>
+      <a:fontRef idx="minor"/>
+    </dgm:style>
+  </dgm:styleLbl>
+  <dgm:styleLbl name="solidFgAcc1">
+    <dgm:scene3d>
+      <a:camera prst="orthographicFront"/>
+      <a:lightRig rig="threePt" dir="t"/>
+    </dgm:scene3d>
+    <dgm:sp3d/>
+    <dgm:txPr/>
+    <dgm:style>
+      <a:lnRef idx="2">
+        <a:scrgbClr r="0" g="0" b="0"/>
+      </a:lnRef>
+      <a:fillRef idx="1">
+        <a:scrgbClr r="0" g="0" b="0"/>
+      </a:fillRef>
+      <a:effectRef idx="0">
+        <a:scrgbClr r="0" g="0" b="0"/>
+      </a:effectRef>
+      <a:fontRef idx="minor"/>
+    </dgm:style>
+  </dgm:styleLbl>
+  <dgm:styleLbl name="solidAlignAcc1">
+    <dgm:scene3d>
+      <a:camera prst="orthographicFront"/>
+      <a:lightRig rig="threePt" dir="t"/>
+    </dgm:scene3d>
+    <dgm:sp3d/>
+    <dgm:txPr/>
+    <dgm:style>
+      <a:lnRef idx="2">
+        <a:scrgbClr r="0" g="0" b="0"/>
+      </a:lnRef>
+      <a:fillRef idx="1">
+        <a:scrgbClr r="0" g="0" b="0"/>
+      </a:fillRef>
+      <a:effectRef idx="0">
+        <a:scrgbClr r="0" g="0" b="0"/>
+      </a:effectRef>
+      <a:fontRef idx="minor"/>
+    </dgm:style>
+  </dgm:styleLbl>
+  <dgm:styleLbl name="solidBgAcc1">
+    <dgm:scene3d>
+      <a:camera prst="orthographicFront"/>
+      <a:lightRig rig="threePt" dir="t"/>
+    </dgm:scene3d>
+    <dgm:sp3d/>
+    <dgm:txPr/>
+    <dgm:style>
+      <a:lnRef idx="2">
+        <a:scrgbClr r="0" g="0" b="0"/>
+      </a:lnRef>
+      <a:fillRef idx="1">
+        <a:scrgbClr r="0" g="0" b="0"/>
+      </a:fillRef>
+      <a:effectRef idx="0">
+        <a:scrgbClr r="0" g="0" b="0"/>
+      </a:effectRef>
+      <a:fontRef idx="minor"/>
+    </dgm:style>
+  </dgm:styleLbl>
+  <dgm:styleLbl name="fgAccFollowNode1">
+    <dgm:scene3d>
+      <a:camera prst="orthographicFront"/>
+      <a:lightRig rig="threePt" dir="t"/>
+    </dgm:scene3d>
+    <dgm:sp3d/>
+    <dgm:txPr/>
+    <dgm:style>
+      <a:lnRef idx="2">
+        <a:scrgbClr r="0" g="0" b="0"/>
+      </a:lnRef>
+      <a:fillRef idx="1">
+        <a:scrgbClr r="0" g="0" b="0"/>
+      </a:fillRef>
+      <a:effectRef idx="0">
+        <a:scrgbClr r="0" g="0" b="0"/>
+      </a:effectRef>
+      <a:fontRef idx="minor"/>
+    </dgm:style>
+  </dgm:styleLbl>
+  <dgm:styleLbl name="alignAccFollowNode1">
+    <dgm:scene3d>
+      <a:camera prst="orthographicFront"/>
+      <a:lightRig rig="threePt" dir="t"/>
+    </dgm:scene3d>
+    <dgm:sp3d/>
+    <dgm:txPr/>
+    <dgm:style>
+      <a:lnRef idx="2">
+        <a:scrgbClr r="0" g="0" b="0"/>
+      </a:lnRef>
+      <a:fillRef idx="1">
+        <a:scrgbClr r="0" g="0" b="0"/>
+      </a:fillRef>
+      <a:effectRef idx="0">
+        <a:scrgbClr r="0" g="0" b="0"/>
+      </a:effectRef>
+      <a:fontRef idx="minor"/>
+    </dgm:style>
+  </dgm:styleLbl>
+  <dgm:styleLbl name="bgAccFollowNode1">
+    <dgm:scene3d>
+      <a:camera prst="orthographicFront"/>
+      <a:lightRig rig="threePt" dir="t"/>
+    </dgm:scene3d>
+    <dgm:sp3d/>
+    <dgm:txPr/>
+    <dgm:style>
+      <a:lnRef idx="2">
+        <a:scrgbClr r="0" g="0" b="0"/>
+      </a:lnRef>
+      <a:fillRef idx="1">
+        <a:scrgbClr r="0" g="0" b="0"/>
+      </a:fillRef>
+      <a:effectRef idx="0">
+        <a:scrgbClr r="0" g="0" b="0"/>
+      </a:effectRef>
+      <a:fontRef idx="minor"/>
+    </dgm:style>
+  </dgm:styleLbl>
+  <dgm:styleLbl name="fgAcc0">
+    <dgm:scene3d>
+      <a:camera prst="orthographicFront"/>
+      <a:lightRig rig="threePt" dir="t"/>
+    </dgm:scene3d>
+    <dgm:sp3d/>
+    <dgm:txPr/>
+    <dgm:style>
+      <a:lnRef idx="2">
+        <a:scrgbClr r="0" g="0" b="0"/>
+      </a:lnRef>
+      <a:fillRef idx="1">
+        <a:scrgbClr r="0" g="0" b="0"/>
+      </a:fillRef>
+      <a:effectRef idx="0">
+        <a:scrgbClr r="0" g="0" b="0"/>
+      </a:effectRef>
+      <a:fontRef idx="minor"/>
+    </dgm:style>
+  </dgm:styleLbl>
+  <dgm:styleLbl name="fgAcc2">
+    <dgm:scene3d>
+      <a:camera prst="orthographicFront"/>
+      <a:lightRig rig="threePt" dir="t"/>
+    </dgm:scene3d>
+    <dgm:sp3d/>
+    <dgm:txPr/>
+    <dgm:style>
+      <a:lnRef idx="2">
+        <a:scrgbClr r="0" g="0" b="0"/>
+      </a:lnRef>
+      <a:fillRef idx="1">
+        <a:scrgbClr r="0" g="0" b="0"/>
+      </a:fillRef>
+      <a:effectRef idx="0">
+        <a:scrgbClr r="0" g="0" b="0"/>
+      </a:effectRef>
+      <a:fontRef idx="minor"/>
+    </dgm:style>
+  </dgm:styleLbl>
+  <dgm:styleLbl name="fgAcc3">
+    <dgm:scene3d>
+      <a:camera prst="orthographicFront"/>
+      <a:lightRig rig="threePt" dir="t"/>
+    </dgm:scene3d>
+    <dgm:sp3d/>
+    <dgm:txPr/>
+    <dgm:style>
+      <a:lnRef idx="2">
+        <a:scrgbClr r="0" g="0" b="0"/>
+      </a:lnRef>
+      <a:fillRef idx="1">
+        <a:scrgbClr r="0" g="0" b="0"/>
+      </a:fillRef>
+      <a:effectRef idx="0">
+        <a:scrgbClr r="0" g="0" b="0"/>
+      </a:effectRef>
+      <a:fontRef idx="minor"/>
+    </dgm:style>
+  </dgm:styleLbl>
+  <dgm:styleLbl name="fgAcc4">
+    <dgm:scene3d>
+      <a:camera prst="orthographicFront"/>
+      <a:lightRig rig="threePt" dir="t"/>
+    </dgm:scene3d>
+    <dgm:sp3d/>
+    <dgm:txPr/>
+    <dgm:style>
+      <a:lnRef idx="2">
+        <a:scrgbClr r="0" g="0" b="0"/>
+      </a:lnRef>
+      <a:fillRef idx="1">
+        <a:scrgbClr r="0" g="0" b="0"/>
+      </a:fillRef>
+      <a:effectRef idx="0">
+        <a:scrgbClr r="0" g="0" b="0"/>
+      </a:effectRef>
+      <a:fontRef idx="minor"/>
+    </dgm:style>
+  </dgm:styleLbl>
+  <dgm:styleLbl name="bgShp">
+    <dgm:scene3d>
+      <a:camera prst="orthographicFront"/>
+      <a:lightRig rig="threePt" dir="t"/>
+    </dgm:scene3d>
+    <dgm:sp3d/>
+    <dgm:txPr/>
+    <dgm:style>
+      <a:lnRef idx="0">
+        <a:scrgbClr r="0" g="0" b="0"/>
+      </a:lnRef>
+      <a:fillRef idx="1">
+        <a:scrgbClr r="0" g="0" b="0"/>
+      </a:fillRef>
+      <a:effectRef idx="0">
+        <a:scrgbClr r="0" g="0" b="0"/>
+      </a:effectRef>
+      <a:fontRef idx="minor"/>
+    </dgm:style>
+  </dgm:styleLbl>
+  <dgm:styleLbl name="dkBgShp">
+    <dgm:scene3d>
+      <a:camera prst="orthographicFront"/>
+      <a:lightRig rig="threePt" dir="t"/>
+    </dgm:scene3d>
+    <dgm:sp3d/>
+    <dgm:txPr/>
+    <dgm:style>
+      <a:lnRef idx="0">
+        <a:scrgbClr r="0" g="0" b="0"/>
+      </a:lnRef>
+      <a:fillRef idx="1">
+        <a:scrgbClr r="0" g="0" b="0"/>
+      </a:fillRef>
+      <a:effectRef idx="0">
+        <a:scrgbClr r="0" g="0" b="0"/>
+      </a:effectRef>
+      <a:fontRef idx="minor"/>
+    </dgm:style>
+  </dgm:styleLbl>
+  <dgm:styleLbl name="trBgShp">
+    <dgm:scene3d>
+      <a:camera prst="orthographicFront"/>
+      <a:lightRig rig="threePt" dir="t"/>
+    </dgm:scene3d>
+    <dgm:sp3d/>
+    <dgm:txPr/>
+    <dgm:style>
+      <a:lnRef idx="0">
+        <a:scrgbClr r="0" g="0" b="0"/>
+      </a:lnRef>
+      <a:fillRef idx="1">
+        <a:scrgbClr r="0" g="0" b="0"/>
+      </a:fillRef>
+      <a:effectRef idx="0">
+        <a:scrgbClr r="0" g="0" b="0"/>
+      </a:effectRef>
+      <a:fontRef idx="minor"/>
+    </dgm:style>
+  </dgm:styleLbl>
+  <dgm:styleLbl name="fgShp">
+    <dgm:scene3d>
+      <a:camera prst="orthographicFront"/>
+      <a:lightRig rig="threePt" dir="t"/>
+    </dgm:scene3d>
+    <dgm:sp3d/>
+    <dgm:txPr/>
+    <dgm:style>
+      <a:lnRef idx="2">
+        <a:scrgbClr r="0" g="0" b="0"/>
+      </a:lnRef>
+      <a:fillRef idx="1">
+        <a:scrgbClr r="0" g="0" b="0"/>
+      </a:fillRef>
+      <a:effectRef idx="0">
+        <a:scrgbClr r="0" g="0" b="0"/>
+      </a:effectRef>
+      <a:fontRef idx="minor"/>
+    </dgm:style>
+  </dgm:styleLbl>
+  <dgm:styleLbl name="revTx">
+    <dgm:scene3d>
+      <a:camera prst="orthographicFront"/>
+      <a:lightRig rig="threePt" dir="t"/>
+    </dgm:scene3d>
+    <dgm:sp3d/>
+    <dgm:txPr/>
+    <dgm:style>
+      <a:lnRef idx="0">
+        <a:scrgbClr r="0" g="0" b="0"/>
+      </a:lnRef>
+      <a:fillRef idx="0">
+        <a:scrgbClr r="0" g="0" b="0"/>
+      </a:fillRef>
+      <a:effectRef idx="0">
+        <a:scrgbClr r="0" g="0" b="0"/>
+      </a:effectRef>
+      <a:fontRef idx="minor"/>
+    </dgm:style>
+  </dgm:styleLbl>
+</dgm:styleDef>
+</file>
+
+<file path=ppt/diagrams/quickStyle2.xml><?xml version="1.0" encoding="utf-8"?>
 <dgm:styleDef xmlns:dgm="http://schemas.openxmlformats.org/drawingml/2006/diagram" xmlns:a="http://schemas.openxmlformats.org/drawingml/2006/main" uniqueId="urn:microsoft.com/office/officeart/2005/8/quickstyle/simple1">
   <dgm:title val=""/>
   <dgm:desc val=""/>
@@ -31680,14 +35089,14 @@
                 <a:latin typeface="Cascadia Code" panose="020B0609020000020004" pitchFamily="49" charset="0"/>
                 <a:cs typeface="Cascadia Code" panose="020B0609020000020004" pitchFamily="49" charset="0"/>
               </a:rPr>
-              <a:t>1 nhóm trở</a:t>
+              <a:t>1 nhóm</a:t>
             </a:r>
             <a:r>
               <a:rPr lang="en-US" sz="2000">
                 <a:latin typeface="Cascadia Code" panose="020B0609020000020004" pitchFamily="49" charset="0"/>
                 <a:cs typeface="Cascadia Code" panose="020B0609020000020004" pitchFamily="49" charset="0"/>
               </a:rPr>
-              <a:t> lên thì cho nó vào </a:t>
+              <a:t> trở lên thì cho nó vào </a:t>
             </a:r>
             <a:r>
               <a:rPr lang="en-US" sz="2000">
@@ -32204,6 +35613,84 @@
         <p:spPr>
           <a:xfrm rot="1920204">
             <a:off x="8958942" y="3285532"/>
+            <a:ext cx="864136" cy="369332"/>
+          </a:xfrm>
+          <a:prstGeom prst="rect">
+            <a:avLst/>
+          </a:prstGeom>
+          <a:noFill/>
+        </p:spPr>
+        <p:txBody>
+          <a:bodyPr wrap="square">
+            <a:spAutoFit/>
+          </a:bodyPr>
+          <a:lstStyle/>
+          <a:p>
+            <a:r>
+              <a:rPr lang="en-US" sz="1800">
+                <a:latin typeface="Cascadia Code" panose="020B0609020000020004" pitchFamily="49" charset="0"/>
+                <a:cs typeface="Cascadia Code" panose="020B0609020000020004" pitchFamily="49" charset="0"/>
+              </a:rPr>
+              <a:t>giao</a:t>
+            </a:r>
+            <a:endParaRPr lang="en-US"/>
+          </a:p>
+        </p:txBody>
+      </p:sp>
+      <p:sp>
+        <p:nvSpPr>
+          <p:cNvPr id="16" name="TextBox 15">
+            <a:extLst>
+              <a:ext uri="{FF2B5EF4-FFF2-40B4-BE49-F238E27FC236}">
+                <a16:creationId xmlns:a16="http://schemas.microsoft.com/office/drawing/2014/main" id="{44116E4A-9A04-3B09-B602-DDABFB4B5914}"/>
+              </a:ext>
+            </a:extLst>
+          </p:cNvPr>
+          <p:cNvSpPr txBox="1"/>
+          <p:nvPr/>
+        </p:nvSpPr>
+        <p:spPr>
+          <a:xfrm rot="4895431">
+            <a:off x="10134936" y="2832995"/>
+            <a:ext cx="864136" cy="369332"/>
+          </a:xfrm>
+          <a:prstGeom prst="rect">
+            <a:avLst/>
+          </a:prstGeom>
+          <a:noFill/>
+        </p:spPr>
+        <p:txBody>
+          <a:bodyPr wrap="square">
+            <a:spAutoFit/>
+          </a:bodyPr>
+          <a:lstStyle/>
+          <a:p>
+            <a:r>
+              <a:rPr lang="en-US" sz="1800">
+                <a:latin typeface="Cascadia Code" panose="020B0609020000020004" pitchFamily="49" charset="0"/>
+                <a:cs typeface="Cascadia Code" panose="020B0609020000020004" pitchFamily="49" charset="0"/>
+              </a:rPr>
+              <a:t>giao</a:t>
+            </a:r>
+            <a:endParaRPr lang="en-US"/>
+          </a:p>
+        </p:txBody>
+      </p:sp>
+      <p:sp>
+        <p:nvSpPr>
+          <p:cNvPr id="18" name="TextBox 17">
+            <a:extLst>
+              <a:ext uri="{FF2B5EF4-FFF2-40B4-BE49-F238E27FC236}">
+                <a16:creationId xmlns:a16="http://schemas.microsoft.com/office/drawing/2014/main" id="{9C9D39AE-5C9A-3EFD-836D-42C165C9F973}"/>
+              </a:ext>
+            </a:extLst>
+          </p:cNvPr>
+          <p:cNvSpPr txBox="1"/>
+          <p:nvPr/>
+        </p:nvSpPr>
+        <p:spPr>
+          <a:xfrm rot="18453918">
+            <a:off x="9540666" y="4990773"/>
             <a:ext cx="864136" cy="369332"/>
           </a:xfrm>
           <a:prstGeom prst="rect">
@@ -36164,7 +39651,7 @@
             <p:ph type="pic" sz="quarter" idx="13"/>
           </p:nvPr>
         </p:nvPicPr>
-        <p:blipFill>
+        <p:blipFill rotWithShape="1">
           <a:blip r:embed="rId9">
             <a:extLst>
               <a:ext uri="{28A0092B-C50C-407E-A947-70E740481C1C}">
@@ -36172,12 +39659,15 @@
               </a:ext>
             </a:extLst>
           </a:blip>
-          <a:srcRect t="6050" b="6050"/>
-          <a:stretch>
-            <a:fillRect/>
-          </a:stretch>
+          <a:srcRect l="-290" t="6050" r="290" b="6050"/>
+          <a:stretch/>
         </p:blipFill>
-        <p:spPr/>
+        <p:spPr>
+          <a:xfrm>
+            <a:off x="-12866" y="1"/>
+            <a:ext cx="5913439" cy="6857999"/>
+          </a:xfrm>
+        </p:spPr>
       </p:pic>
       <p:sp>
         <p:nvSpPr>
@@ -41669,351 +45159,43 @@
           <a:lstStyle/>
           <a:p>
             <a:r>
-              <a:rPr lang="en-US" dirty="0" err="1">
+              <a:rPr lang="en-US">
                 <a:solidFill>
                   <a:srgbClr val="FFFFFF"/>
                 </a:solidFill>
               </a:rPr>
-              <a:t>Lớp</a:t>
-            </a:r>
-            <a:r>
-              <a:rPr lang="en-US" dirty="0">
-                <a:solidFill>
-                  <a:srgbClr val="FFFFFF"/>
-                </a:solidFill>
-              </a:rPr>
-              <a:t> </a:t>
-            </a:r>
-            <a:r>
-              <a:rPr lang="en-US" dirty="0" err="1">
-                <a:solidFill>
-                  <a:srgbClr val="FFFFFF"/>
-                </a:solidFill>
-              </a:rPr>
-              <a:t>hình</a:t>
+              <a:t>Lớp hình</a:t>
             </a:r>
             <a:endParaRPr lang="en-US" dirty="0"/>
           </a:p>
         </p:txBody>
       </p:sp>
-      <p:sp>
-        <p:nvSpPr>
-          <p:cNvPr id="3" name="Content Placeholder 2">
+      <p:graphicFrame>
+        <p:nvGraphicFramePr>
+          <p:cNvPr id="8" name="Content Placeholder 2">
             <a:extLst>
               <a:ext uri="{FF2B5EF4-FFF2-40B4-BE49-F238E27FC236}">
-                <a16:creationId xmlns:a16="http://schemas.microsoft.com/office/drawing/2014/main" id="{869C3FD2-AF88-4EF1-AFB7-5D31BD5AA0BF}"/>
+                <a16:creationId xmlns:a16="http://schemas.microsoft.com/office/drawing/2014/main" id="{4754FBD2-27DA-A699-BF26-47642E6657A0}"/>
               </a:ext>
             </a:extLst>
           </p:cNvPr>
-          <p:cNvSpPr>
-            <a:spLocks noGrp="1"/>
-          </p:cNvSpPr>
+          <p:cNvGraphicFramePr>
+            <a:graphicFrameLocks noGrp="1"/>
+          </p:cNvGraphicFramePr>
           <p:nvPr>
             <p:ph idx="1"/>
           </p:nvPr>
-        </p:nvSpPr>
-        <p:spPr>
-          <a:xfrm>
-            <a:off x="5883040" y="1463040"/>
-            <a:ext cx="5969653" cy="3931920"/>
-          </a:xfrm>
-        </p:spPr>
-        <p:txBody>
-          <a:bodyPr/>
-          <a:lstStyle/>
-          <a:p>
-            <a:pPr marL="0" indent="0">
-              <a:buNone/>
-            </a:pPr>
-            <a:r>
-              <a:rPr lang="en-US" dirty="0" err="1">
-                <a:latin typeface="Arial" panose="020B0604020202020204" pitchFamily="34" charset="0"/>
-                <a:cs typeface="Arial" panose="020B0604020202020204" pitchFamily="34" charset="0"/>
-              </a:rPr>
-              <a:t>Lấy</a:t>
-            </a:r>
-            <a:r>
-              <a:rPr lang="en-US" dirty="0">
-                <a:latin typeface="Arial" panose="020B0604020202020204" pitchFamily="34" charset="0"/>
-                <a:cs typeface="Arial" panose="020B0604020202020204" pitchFamily="34" charset="0"/>
-              </a:rPr>
-              <a:t> </a:t>
-            </a:r>
-            <a:r>
-              <a:rPr lang="en-US" dirty="0" err="1">
-                <a:latin typeface="Arial" panose="020B0604020202020204" pitchFamily="34" charset="0"/>
-                <a:cs typeface="Arial" panose="020B0604020202020204" pitchFamily="34" charset="0"/>
-              </a:rPr>
-              <a:t>tâm</a:t>
-            </a:r>
-            <a:r>
-              <a:rPr lang="en-US" dirty="0">
-                <a:latin typeface="Arial" panose="020B0604020202020204" pitchFamily="34" charset="0"/>
-                <a:cs typeface="Arial" panose="020B0604020202020204" pitchFamily="34" charset="0"/>
-              </a:rPr>
-              <a:t> </a:t>
-            </a:r>
-            <a:r>
-              <a:rPr lang="en-US" dirty="0">
-                <a:highlight>
-                  <a:srgbClr val="FFFF00"/>
-                </a:highlight>
-                <a:latin typeface="Arial" panose="020B0604020202020204" pitchFamily="34" charset="0"/>
-                <a:cs typeface="Arial" panose="020B0604020202020204" pitchFamily="34" charset="0"/>
-              </a:rPr>
-              <a:t>(Centroid)</a:t>
-            </a:r>
-          </a:p>
-          <a:p>
-            <a:pPr marL="0" indent="0">
-              <a:buNone/>
-            </a:pPr>
-            <a:r>
-              <a:rPr lang="en-US" dirty="0" err="1">
-                <a:latin typeface="Arial" panose="020B0604020202020204" pitchFamily="34" charset="0"/>
-                <a:cs typeface="Arial" panose="020B0604020202020204" pitchFamily="34" charset="0"/>
-              </a:rPr>
-              <a:t>Lấy</a:t>
-            </a:r>
-            <a:r>
-              <a:rPr lang="en-US" dirty="0">
-                <a:latin typeface="Arial" panose="020B0604020202020204" pitchFamily="34" charset="0"/>
-                <a:cs typeface="Arial" panose="020B0604020202020204" pitchFamily="34" charset="0"/>
-              </a:rPr>
-              <a:t> </a:t>
-            </a:r>
-            <a:r>
-              <a:rPr lang="en-US" dirty="0" err="1">
-                <a:latin typeface="Arial" panose="020B0604020202020204" pitchFamily="34" charset="0"/>
-                <a:cs typeface="Arial" panose="020B0604020202020204" pitchFamily="34" charset="0"/>
-              </a:rPr>
-              <a:t>diện</a:t>
-            </a:r>
-            <a:r>
-              <a:rPr lang="en-US" dirty="0">
-                <a:latin typeface="Arial" panose="020B0604020202020204" pitchFamily="34" charset="0"/>
-                <a:cs typeface="Arial" panose="020B0604020202020204" pitchFamily="34" charset="0"/>
-              </a:rPr>
-              <a:t> </a:t>
-            </a:r>
-            <a:r>
-              <a:rPr lang="en-US" dirty="0" err="1">
-                <a:latin typeface="Arial" panose="020B0604020202020204" pitchFamily="34" charset="0"/>
-                <a:cs typeface="Arial" panose="020B0604020202020204" pitchFamily="34" charset="0"/>
-              </a:rPr>
-              <a:t>tích</a:t>
-            </a:r>
-            <a:r>
-              <a:rPr lang="en-US" dirty="0">
-                <a:latin typeface="Arial" panose="020B0604020202020204" pitchFamily="34" charset="0"/>
-                <a:cs typeface="Arial" panose="020B0604020202020204" pitchFamily="34" charset="0"/>
-              </a:rPr>
-              <a:t> </a:t>
-            </a:r>
-            <a:r>
-              <a:rPr lang="en-US" dirty="0">
-                <a:highlight>
-                  <a:srgbClr val="FFFF00"/>
-                </a:highlight>
-                <a:latin typeface="Arial" panose="020B0604020202020204" pitchFamily="34" charset="0"/>
-                <a:cs typeface="Arial" panose="020B0604020202020204" pitchFamily="34" charset="0"/>
-              </a:rPr>
-              <a:t>(Area)</a:t>
-            </a:r>
-          </a:p>
-          <a:p>
-            <a:pPr marL="0" indent="0">
-              <a:buNone/>
-            </a:pPr>
-            <a:r>
-              <a:rPr lang="en-US" dirty="0" err="1">
-                <a:latin typeface="Arial" panose="020B0604020202020204" pitchFamily="34" charset="0"/>
-                <a:cs typeface="Arial" panose="020B0604020202020204" pitchFamily="34" charset="0"/>
-              </a:rPr>
-              <a:t>Kiểm</a:t>
-            </a:r>
-            <a:r>
-              <a:rPr lang="en-US" dirty="0">
-                <a:latin typeface="Arial" panose="020B0604020202020204" pitchFamily="34" charset="0"/>
-                <a:cs typeface="Arial" panose="020B0604020202020204" pitchFamily="34" charset="0"/>
-              </a:rPr>
-              <a:t> </a:t>
-            </a:r>
-            <a:r>
-              <a:rPr lang="en-US" dirty="0" err="1">
-                <a:latin typeface="Arial" panose="020B0604020202020204" pitchFamily="34" charset="0"/>
-                <a:cs typeface="Arial" panose="020B0604020202020204" pitchFamily="34" charset="0"/>
-              </a:rPr>
-              <a:t>tra</a:t>
-            </a:r>
-            <a:r>
-              <a:rPr lang="en-US" dirty="0">
-                <a:latin typeface="Arial" panose="020B0604020202020204" pitchFamily="34" charset="0"/>
-                <a:cs typeface="Arial" panose="020B0604020202020204" pitchFamily="34" charset="0"/>
-              </a:rPr>
-              <a:t> </a:t>
-            </a:r>
-            <a:r>
-              <a:rPr lang="en-US" dirty="0" err="1">
-                <a:latin typeface="Arial" panose="020B0604020202020204" pitchFamily="34" charset="0"/>
-                <a:cs typeface="Arial" panose="020B0604020202020204" pitchFamily="34" charset="0"/>
-              </a:rPr>
-              <a:t>điểm</a:t>
-            </a:r>
-            <a:r>
-              <a:rPr lang="en-US" dirty="0">
-                <a:latin typeface="Arial" panose="020B0604020202020204" pitchFamily="34" charset="0"/>
-                <a:cs typeface="Arial" panose="020B0604020202020204" pitchFamily="34" charset="0"/>
-              </a:rPr>
-              <a:t> </a:t>
-            </a:r>
-            <a:r>
-              <a:rPr lang="en-US" dirty="0" err="1">
-                <a:latin typeface="Arial" panose="020B0604020202020204" pitchFamily="34" charset="0"/>
-                <a:cs typeface="Arial" panose="020B0604020202020204" pitchFamily="34" charset="0"/>
-              </a:rPr>
-              <a:t>chứa</a:t>
-            </a:r>
-            <a:r>
-              <a:rPr lang="en-US" dirty="0">
-                <a:latin typeface="Arial" panose="020B0604020202020204" pitchFamily="34" charset="0"/>
-                <a:cs typeface="Arial" panose="020B0604020202020204" pitchFamily="34" charset="0"/>
-              </a:rPr>
-              <a:t> </a:t>
-            </a:r>
-            <a:r>
-              <a:rPr lang="en-US" dirty="0" err="1">
-                <a:latin typeface="Arial" panose="020B0604020202020204" pitchFamily="34" charset="0"/>
-                <a:cs typeface="Arial" panose="020B0604020202020204" pitchFamily="34" charset="0"/>
-              </a:rPr>
-              <a:t>trong</a:t>
-            </a:r>
-            <a:r>
-              <a:rPr lang="en-US" dirty="0">
-                <a:latin typeface="Arial" panose="020B0604020202020204" pitchFamily="34" charset="0"/>
-                <a:cs typeface="Arial" panose="020B0604020202020204" pitchFamily="34" charset="0"/>
-              </a:rPr>
-              <a:t> </a:t>
-            </a:r>
-            <a:r>
-              <a:rPr lang="en-US" dirty="0">
-                <a:highlight>
-                  <a:srgbClr val="FFFF00"/>
-                </a:highlight>
-                <a:latin typeface="Arial" panose="020B0604020202020204" pitchFamily="34" charset="0"/>
-                <a:cs typeface="Arial" panose="020B0604020202020204" pitchFamily="34" charset="0"/>
-              </a:rPr>
-              <a:t>(</a:t>
-            </a:r>
-            <a:r>
-              <a:rPr lang="en-US" dirty="0" err="1">
-                <a:highlight>
-                  <a:srgbClr val="FFFF00"/>
-                </a:highlight>
-                <a:latin typeface="Arial" panose="020B0604020202020204" pitchFamily="34" charset="0"/>
-                <a:cs typeface="Arial" panose="020B0604020202020204" pitchFamily="34" charset="0"/>
-              </a:rPr>
-              <a:t>IsInside</a:t>
-            </a:r>
-            <a:r>
-              <a:rPr lang="en-US" dirty="0">
-                <a:highlight>
-                  <a:srgbClr val="FFFF00"/>
-                </a:highlight>
-                <a:latin typeface="Arial" panose="020B0604020202020204" pitchFamily="34" charset="0"/>
-                <a:cs typeface="Arial" panose="020B0604020202020204" pitchFamily="34" charset="0"/>
-              </a:rPr>
-              <a:t>)</a:t>
-            </a:r>
-          </a:p>
-          <a:p>
-            <a:pPr marL="0" indent="0">
-              <a:buNone/>
-            </a:pPr>
-            <a:r>
-              <a:rPr lang="en-US" dirty="0" err="1">
-                <a:latin typeface="Arial" panose="020B0604020202020204" pitchFamily="34" charset="0"/>
-                <a:cs typeface="Arial" panose="020B0604020202020204" pitchFamily="34" charset="0"/>
-              </a:rPr>
-              <a:t>Vẽ</a:t>
-            </a:r>
-            <a:r>
-              <a:rPr lang="en-US" dirty="0">
-                <a:latin typeface="Arial" panose="020B0604020202020204" pitchFamily="34" charset="0"/>
-                <a:cs typeface="Arial" panose="020B0604020202020204" pitchFamily="34" charset="0"/>
-              </a:rPr>
-              <a:t> </a:t>
-            </a:r>
-            <a:r>
-              <a:rPr lang="en-US" dirty="0" err="1">
-                <a:latin typeface="Arial" panose="020B0604020202020204" pitchFamily="34" charset="0"/>
-                <a:cs typeface="Arial" panose="020B0604020202020204" pitchFamily="34" charset="0"/>
-              </a:rPr>
-              <a:t>Viền</a:t>
-            </a:r>
-            <a:r>
-              <a:rPr lang="en-US" dirty="0">
-                <a:latin typeface="Arial" panose="020B0604020202020204" pitchFamily="34" charset="0"/>
-                <a:cs typeface="Arial" panose="020B0604020202020204" pitchFamily="34" charset="0"/>
-              </a:rPr>
-              <a:t> </a:t>
-            </a:r>
-            <a:r>
-              <a:rPr lang="en-US" dirty="0">
-                <a:highlight>
-                  <a:srgbClr val="FFFF00"/>
-                </a:highlight>
-                <a:latin typeface="Arial" panose="020B0604020202020204" pitchFamily="34" charset="0"/>
-                <a:cs typeface="Arial" panose="020B0604020202020204" pitchFamily="34" charset="0"/>
-              </a:rPr>
-              <a:t>(draw)</a:t>
-            </a:r>
-          </a:p>
-          <a:p>
-            <a:pPr marL="0" indent="0">
-              <a:buNone/>
-            </a:pPr>
-            <a:r>
-              <a:rPr lang="en-US" dirty="0" err="1">
-                <a:latin typeface="Arial" panose="020B0604020202020204" pitchFamily="34" charset="0"/>
-                <a:cs typeface="Arial" panose="020B0604020202020204" pitchFamily="34" charset="0"/>
-              </a:rPr>
-              <a:t>Tô</a:t>
-            </a:r>
-            <a:r>
-              <a:rPr lang="en-US" dirty="0">
-                <a:latin typeface="Arial" panose="020B0604020202020204" pitchFamily="34" charset="0"/>
-                <a:cs typeface="Arial" panose="020B0604020202020204" pitchFamily="34" charset="0"/>
-              </a:rPr>
-              <a:t> </a:t>
-            </a:r>
-            <a:r>
-              <a:rPr lang="en-US" dirty="0" err="1">
-                <a:latin typeface="Arial" panose="020B0604020202020204" pitchFamily="34" charset="0"/>
-                <a:cs typeface="Arial" panose="020B0604020202020204" pitchFamily="34" charset="0"/>
-              </a:rPr>
-              <a:t>nền</a:t>
-            </a:r>
-            <a:r>
-              <a:rPr lang="en-US" dirty="0">
-                <a:latin typeface="Arial" panose="020B0604020202020204" pitchFamily="34" charset="0"/>
-                <a:cs typeface="Arial" panose="020B0604020202020204" pitchFamily="34" charset="0"/>
-              </a:rPr>
-              <a:t> </a:t>
-            </a:r>
-            <a:r>
-              <a:rPr lang="en-US" dirty="0">
-                <a:highlight>
-                  <a:srgbClr val="FFFF00"/>
-                </a:highlight>
-                <a:latin typeface="Arial" panose="020B0604020202020204" pitchFamily="34" charset="0"/>
-                <a:cs typeface="Arial" panose="020B0604020202020204" pitchFamily="34" charset="0"/>
-              </a:rPr>
-              <a:t>(fill)</a:t>
-            </a:r>
-          </a:p>
-        </p:txBody>
-      </p:sp>
+        </p:nvGraphicFramePr>
+        <p:xfrm>
+          <a:off x="5883040" y="1463040"/>
+          <a:ext cx="5969653" cy="3931920"/>
+        </p:xfrm>
+        <a:graphic>
+          <a:graphicData uri="http://schemas.openxmlformats.org/drawingml/2006/diagram">
+            <dgm:relIds xmlns:dgm="http://schemas.openxmlformats.org/drawingml/2006/diagram" xmlns:r="http://schemas.openxmlformats.org/officeDocument/2006/relationships" r:dm="rId2" r:lo="rId3" r:qs="rId4" r:cs="rId5"/>
+          </a:graphicData>
+        </a:graphic>
+      </p:graphicFrame>
       <p:sp>
         <p:nvSpPr>
           <p:cNvPr id="4" name="Date Placeholder 3">
@@ -43222,18 +46404,18 @@
 </file>
 
 <file path=customXml/item2.xml><?xml version="1.0" encoding="utf-8"?>
-<p:properties xmlns:p="http://schemas.microsoft.com/office/2006/metadata/properties" xmlns:xsi="http://www.w3.org/2001/XMLSchema-instance" xmlns:pc="http://schemas.microsoft.com/office/infopath/2007/PartnerControls">
-  <documentManagement/>
-</p:properties>
-</file>
-
-<file path=customXml/item3.xml><?xml version="1.0" encoding="utf-8"?>
 <?mso-contentType ?>
 <FormTemplates xmlns="http://schemas.microsoft.com/sharepoint/v3/contenttype/forms">
   <Display>DocumentLibraryForm</Display>
   <Edit>DocumentLibraryForm</Edit>
   <New>DocumentLibraryForm</New>
 </FormTemplates>
+</file>
+
+<file path=customXml/item3.xml><?xml version="1.0" encoding="utf-8"?>
+<p:properties xmlns:p="http://schemas.microsoft.com/office/2006/metadata/properties" xmlns:xsi="http://www.w3.org/2001/XMLSchema-instance" xmlns:pc="http://schemas.microsoft.com/office/infopath/2007/PartnerControls">
+  <documentManagement/>
+</p:properties>
 </file>
 
 <file path=customXml/itemProps1.xml><?xml version="1.0" encoding="utf-8"?>
@@ -43255,6 +46437,14 @@
 </file>
 
 <file path=customXml/itemProps2.xml><?xml version="1.0" encoding="utf-8"?>
+<ds:datastoreItem xmlns:ds="http://schemas.openxmlformats.org/officeDocument/2006/customXml" ds:itemID="{78F05AFF-D6C5-4AFF-B762-03B56A06549F}">
+  <ds:schemaRefs>
+    <ds:schemaRef ds:uri="http://schemas.microsoft.com/sharepoint/v3/contenttype/forms"/>
+  </ds:schemaRefs>
+</ds:datastoreItem>
+</file>
+
+<file path=customXml/itemProps3.xml><?xml version="1.0" encoding="utf-8"?>
 <ds:datastoreItem xmlns:ds="http://schemas.openxmlformats.org/officeDocument/2006/customXml" ds:itemID="{80F67494-5E2B-4957-A173-674997570D3D}">
   <ds:schemaRefs>
     <ds:schemaRef ds:uri="http://schemas.microsoft.com/office/2006/metadata/properties"/>
@@ -43268,12 +46458,4 @@
     <ds:schemaRef ds:uri="http://purl.org/dc/elements/1.1/"/>
   </ds:schemaRefs>
 </ds:datastoreItem>
-</file>
-
-<file path=customXml/itemProps3.xml><?xml version="1.0" encoding="utf-8"?>
-<ds:datastoreItem xmlns:ds="http://schemas.openxmlformats.org/officeDocument/2006/customXml" ds:itemID="{78F05AFF-D6C5-4AFF-B762-03B56A06549F}">
-  <ds:schemaRefs>
-    <ds:schemaRef ds:uri="http://schemas.microsoft.com/sharepoint/v3/contenttype/forms"/>
-  </ds:schemaRefs>
-</ds:datastoreItem>
 </file>
</xml_diff>